<commit_message>
Ready (?) for presentation (btagging SF's vs no btag sf's)
</commit_message>
<xml_diff>
--- a/Documents for Progress/AnalysisStatus_31August2020.pptx
+++ b/Documents for Progress/AnalysisStatus_31August2020.pptx
@@ -6,10 +6,10 @@
     <p:sldMasterId id="2147483661" r:id="rId2"/>
   </p:sldMasterIdLst>
   <p:notesMasterIdLst>
-    <p:notesMasterId r:id="rId36"/>
+    <p:notesMasterId r:id="rId39"/>
   </p:notesMasterIdLst>
   <p:handoutMasterIdLst>
-    <p:handoutMasterId r:id="rId37"/>
+    <p:handoutMasterId r:id="rId40"/>
   </p:handoutMasterIdLst>
   <p:sldIdLst>
     <p:sldId id="256" r:id="rId3"/>
@@ -36,15 +36,18 @@
     <p:sldId id="537" r:id="rId24"/>
     <p:sldId id="538" r:id="rId25"/>
     <p:sldId id="539" r:id="rId26"/>
-    <p:sldId id="540" r:id="rId27"/>
-    <p:sldId id="541" r:id="rId28"/>
-    <p:sldId id="542" r:id="rId29"/>
-    <p:sldId id="543" r:id="rId30"/>
-    <p:sldId id="544" r:id="rId31"/>
-    <p:sldId id="535" r:id="rId32"/>
-    <p:sldId id="529" r:id="rId33"/>
-    <p:sldId id="530" r:id="rId34"/>
-    <p:sldId id="532" r:id="rId35"/>
+    <p:sldId id="545" r:id="rId27"/>
+    <p:sldId id="540" r:id="rId28"/>
+    <p:sldId id="546" r:id="rId29"/>
+    <p:sldId id="541" r:id="rId30"/>
+    <p:sldId id="547" r:id="rId31"/>
+    <p:sldId id="542" r:id="rId32"/>
+    <p:sldId id="543" r:id="rId33"/>
+    <p:sldId id="544" r:id="rId34"/>
+    <p:sldId id="535" r:id="rId35"/>
+    <p:sldId id="529" r:id="rId36"/>
+    <p:sldId id="530" r:id="rId37"/>
+    <p:sldId id="532" r:id="rId38"/>
   </p:sldIdLst>
   <p:sldSz cx="12192000" cy="6858000"/>
   <p:notesSz cx="6858000" cy="9144000"/>
@@ -906,7 +909,7 @@
           <a:p>
             <a:fld id="{5033F1CD-332F-48CC-8A24-9D0A5CE7D91D}" type="slidenum">
               <a:rPr lang="en-GB" smtClean="0"/>
-              <a:t>33</a:t>
+              <a:t>36</a:t>
             </a:fld>
             <a:endParaRPr lang="en-GB"/>
           </a:p>
@@ -10305,8 +10308,8 @@
           </a:p>
         </p:txBody>
       </p:sp>
-      <mc:AlternateContent xmlns:mc="http://schemas.openxmlformats.org/markup-compatibility/2006">
-        <mc:Choice xmlns:a14="http://schemas.microsoft.com/office/drawing/2010/main" Requires="a14">
+      <mc:AlternateContent xmlns:mc="http://schemas.openxmlformats.org/markup-compatibility/2006" xmlns:a14="http://schemas.microsoft.com/office/drawing/2010/main">
+        <mc:Choice Requires="a14">
           <p:sp>
             <p:nvSpPr>
               <p:cNvPr id="4" name="TextBox 3">
@@ -10727,7 +10730,7 @@
             </p:txBody>
           </p:sp>
         </mc:Choice>
-        <mc:Fallback>
+        <mc:Fallback xmlns="">
           <p:sp>
             <p:nvSpPr>
               <p:cNvPr id="4" name="TextBox 3">
@@ -11920,217 +11923,6 @@
           </a:p>
         </p:txBody>
       </p:sp>
-      <p:sp>
-        <p:nvSpPr>
-          <p:cNvPr id="7" name="TextBox 6"/>
-          <p:cNvSpPr txBox="1"/>
-          <p:nvPr/>
-        </p:nvSpPr>
-        <p:spPr>
-          <a:xfrm>
-            <a:off x="130629" y="937162"/>
-            <a:ext cx="11771786" cy="5078313"/>
-          </a:xfrm>
-          <a:prstGeom prst="rect">
-            <a:avLst/>
-          </a:prstGeom>
-          <a:noFill/>
-        </p:spPr>
-        <p:txBody>
-          <a:bodyPr wrap="square" rtlCol="0">
-            <a:spAutoFit/>
-          </a:bodyPr>
-          <a:lstStyle/>
-          <a:p>
-            <a:pPr marL="285750" indent="-285750">
-              <a:buClr>
-                <a:schemeClr val="accent1"/>
-              </a:buClr>
-              <a:buFont typeface="Arial" panose="020B0604020202020204" pitchFamily="34" charset="0"/>
-              <a:buChar char="•"/>
-            </a:pPr>
-            <a:r>
-              <a:rPr lang="en-US" dirty="0"/>
-              <a:t>We have identified that the contamination in the control region coming form the subdominant processes is also significant and, in some cases, even more significant than the one coming from ttbar. </a:t>
-            </a:r>
-          </a:p>
-          <a:p>
-            <a:pPr marL="285750" indent="-285750">
-              <a:buClr>
-                <a:schemeClr val="accent1"/>
-              </a:buClr>
-              <a:buFont typeface="Arial" panose="020B0604020202020204" pitchFamily="34" charset="0"/>
-              <a:buChar char="•"/>
-            </a:pPr>
-            <a:r>
-              <a:rPr lang="en-US" dirty="0"/>
-              <a:t>Although it can be seen that selecting the b-tagging  loose working point for our control region improves the situation concerning the ttbar contamination, the subdominant </a:t>
-            </a:r>
-            <a:r>
-              <a:rPr lang="en-US" dirty="0" err="1"/>
-              <a:t>bkg</a:t>
-            </a:r>
-            <a:r>
-              <a:rPr lang="en-US" dirty="0"/>
-              <a:t>  still remains significant especially in the area around the W mass.</a:t>
-            </a:r>
-          </a:p>
-          <a:p>
-            <a:pPr>
-              <a:buClr>
-                <a:schemeClr val="accent1"/>
-              </a:buClr>
-            </a:pPr>
-            <a:endParaRPr lang="en-US" dirty="0"/>
-          </a:p>
-          <a:p>
-            <a:pPr>
-              <a:buClr>
-                <a:schemeClr val="accent1"/>
-              </a:buClr>
-            </a:pPr>
-            <a:r>
-              <a:rPr lang="en-US" dirty="0"/>
-              <a:t>We tried 3 different fitting methods, all using the medium b-tagging working point for both regions (Signal and Control</a:t>
-            </a:r>
-            <a:br>
-              <a:rPr lang="en-US" dirty="0"/>
-            </a:br>
-            <a:r>
-              <a:rPr lang="en-US" dirty="0"/>
-              <a:t>region).</a:t>
-            </a:r>
-          </a:p>
-          <a:p>
-            <a:pPr>
-              <a:buClr>
-                <a:schemeClr val="accent1"/>
-              </a:buClr>
-            </a:pPr>
-            <a:endParaRPr lang="en-US" dirty="0"/>
-          </a:p>
-          <a:p>
-            <a:pPr marL="285750" indent="-285750">
-              <a:buClr>
-                <a:schemeClr val="accent1"/>
-              </a:buClr>
-              <a:buFont typeface="Arial" panose="020B0604020202020204" pitchFamily="34" charset="0"/>
-              <a:buChar char="•"/>
-            </a:pPr>
-            <a:r>
-              <a:rPr lang="en-US" dirty="0"/>
-              <a:t>First, we fit only the 2btag region but we use a ttbar and subdominant </a:t>
-            </a:r>
-            <a:r>
-              <a:rPr lang="en-US" dirty="0" err="1"/>
-              <a:t>bkg</a:t>
-            </a:r>
-            <a:r>
-              <a:rPr lang="en-US" dirty="0"/>
-              <a:t> free area to generate the </a:t>
-            </a:r>
-            <a:r>
-              <a:rPr lang="en-US" dirty="0" err="1"/>
-              <a:t>qcd</a:t>
-            </a:r>
-            <a:r>
-              <a:rPr lang="en-US" dirty="0"/>
-              <a:t> template.</a:t>
-            </a:r>
-            <a:br>
-              <a:rPr lang="en-US" dirty="0"/>
-            </a:br>
-            <a:r>
-              <a:rPr lang="en-US" dirty="0"/>
-              <a:t>We calculate this area using QCD = Data(0btag) – </a:t>
-            </a:r>
-            <a:r>
-              <a:rPr lang="en-US" dirty="0" err="1"/>
-              <a:t>ttbar</a:t>
-            </a:r>
-            <a:r>
-              <a:rPr lang="en-US" dirty="0"/>
-              <a:t> (0btag) – subdominant (0btag) where both </a:t>
-            </a:r>
-            <a:r>
-              <a:rPr lang="en-US" dirty="0" err="1"/>
-              <a:t>ttbar</a:t>
-            </a:r>
-            <a:r>
-              <a:rPr lang="en-US" dirty="0"/>
-              <a:t> and subdominant </a:t>
-            </a:r>
-            <a:br>
-              <a:rPr lang="en-US" dirty="0"/>
-            </a:br>
-            <a:r>
-              <a:rPr lang="en-US" dirty="0"/>
-              <a:t>are taken from MC.</a:t>
-            </a:r>
-          </a:p>
-          <a:p>
-            <a:pPr>
-              <a:buClr>
-                <a:schemeClr val="accent1"/>
-              </a:buClr>
-            </a:pPr>
-            <a:endParaRPr lang="en-US" dirty="0"/>
-          </a:p>
-          <a:p>
-            <a:pPr marL="285750" indent="-285750">
-              <a:buClr>
-                <a:schemeClr val="accent1"/>
-              </a:buClr>
-              <a:buFont typeface="Arial" panose="020B0604020202020204" pitchFamily="34" charset="0"/>
-              <a:buChar char="•"/>
-            </a:pPr>
-            <a:r>
-              <a:rPr lang="en-US" dirty="0"/>
-              <a:t>We do a simultaneous fit in the 0btag and 2 </a:t>
-            </a:r>
-            <a:r>
-              <a:rPr lang="en-US" dirty="0" err="1"/>
-              <a:t>btag</a:t>
-            </a:r>
-            <a:r>
-              <a:rPr lang="en-US" dirty="0"/>
-              <a:t> regions where we add an extra Gaussian in the QCD template in order to</a:t>
-            </a:r>
-            <a:br>
-              <a:rPr lang="en-US" dirty="0"/>
-            </a:br>
-            <a:r>
-              <a:rPr lang="en-US" dirty="0"/>
-              <a:t>compensate for the contamination coming from the subdominant backgrounds.</a:t>
-            </a:r>
-          </a:p>
-          <a:p>
-            <a:pPr>
-              <a:buClr>
-                <a:schemeClr val="accent1"/>
-              </a:buClr>
-            </a:pPr>
-            <a:endParaRPr lang="en-US" dirty="0"/>
-          </a:p>
-          <a:p>
-            <a:pPr marL="285750" indent="-285750">
-              <a:buClr>
-                <a:schemeClr val="accent1"/>
-              </a:buClr>
-              <a:buFont typeface="Arial" panose="020B0604020202020204" pitchFamily="34" charset="0"/>
-              <a:buChar char="•"/>
-            </a:pPr>
-            <a:r>
-              <a:rPr lang="en-US" dirty="0"/>
-              <a:t>We do a simultaneous fit where we use the initial fitting procedure with nothing extra.</a:t>
-            </a:r>
-            <a:br>
-              <a:rPr lang="en-US" dirty="0"/>
-            </a:br>
-            <a:endParaRPr lang="en-US" dirty="0"/>
-          </a:p>
-        </p:txBody>
-      </p:sp>
     </p:spTree>
     <p:extLst>
       <p:ext uri="{BB962C8B-B14F-4D97-AF65-F5344CB8AC3E}">
@@ -13818,15 +13610,15 @@
         </p:nvSpPr>
         <p:spPr>
           <a:xfrm>
-            <a:off x="228600" y="1582340"/>
-            <a:ext cx="6096000" cy="3693319"/>
+            <a:off x="1237088" y="1582339"/>
+            <a:ext cx="3691717" cy="3693319"/>
           </a:xfrm>
           <a:prstGeom prst="rect">
             <a:avLst/>
           </a:prstGeom>
         </p:spPr>
         <p:txBody>
-          <a:bodyPr>
+          <a:bodyPr wrap="square">
             <a:spAutoFit/>
           </a:bodyPr>
           <a:lstStyle/>
@@ -13928,15 +13720,15 @@
         </p:nvSpPr>
         <p:spPr>
           <a:xfrm>
-            <a:off x="6324600" y="1582340"/>
-            <a:ext cx="6096000" cy="3693319"/>
+            <a:off x="7069541" y="1582338"/>
+            <a:ext cx="3691717" cy="3693319"/>
           </a:xfrm>
           <a:prstGeom prst="rect">
             <a:avLst/>
           </a:prstGeom>
         </p:spPr>
         <p:txBody>
-          <a:bodyPr>
+          <a:bodyPr wrap="square">
             <a:spAutoFit/>
           </a:bodyPr>
           <a:lstStyle/>
@@ -14083,53 +13875,6 @@
       </p:sp>
       <p:sp>
         <p:nvSpPr>
-          <p:cNvPr id="7" name="TextBox 6"/>
-          <p:cNvSpPr txBox="1"/>
-          <p:nvPr/>
-        </p:nvSpPr>
-        <p:spPr>
-          <a:xfrm>
-            <a:off x="3276600" y="33090"/>
-            <a:ext cx="5638800" cy="523220"/>
-          </a:xfrm>
-          <a:prstGeom prst="rect">
-            <a:avLst/>
-          </a:prstGeom>
-          <a:noFill/>
-        </p:spPr>
-        <p:txBody>
-          <a:bodyPr wrap="square" rtlCol="0">
-            <a:spAutoFit/>
-          </a:bodyPr>
-          <a:lstStyle/>
-          <a:p>
-            <a:pPr algn="ctr"/>
-            <a:r>
-              <a:rPr lang="en-US" sz="2800" u="sng" dirty="0"/>
-              <a:t>Tag And Probe Calculations </a:t>
-            </a:r>
-            <a:r>
-              <a:rPr lang="en-US" sz="2800" u="sng" dirty="0">
-                <a:solidFill>
-                  <a:srgbClr val="FF0000"/>
-                </a:solidFill>
-              </a:rPr>
-              <a:t>2017</a:t>
-            </a:r>
-            <a:r>
-              <a:rPr lang="en-US" sz="2800" u="sng" dirty="0"/>
-              <a:t> </a:t>
-            </a:r>
-            <a:endParaRPr lang="en-US" sz="2800" u="sng" dirty="0">
-              <a:solidFill>
-                <a:srgbClr val="00B050"/>
-              </a:solidFill>
-            </a:endParaRPr>
-          </a:p>
-        </p:txBody>
-      </p:sp>
-      <p:sp>
-        <p:nvSpPr>
           <p:cNvPr id="5" name="Slide Number Placeholder 4">
             <a:extLst>
               <a:ext uri="{FF2B5EF4-FFF2-40B4-BE49-F238E27FC236}">
@@ -14179,7 +13924,7 @@
           <a:bodyPr/>
           <a:lstStyle/>
           <a:p>
-            <a:fld id="{3DBB7BD0-9B8D-1F47-8ABF-BE3CF9BD2848}" type="datetime1">
+            <a:fld id="{D52D66B2-0E0A-F441-A1DA-8039F615D612}" type="datetime1">
               <a:rPr lang="en-US" smtClean="0"/>
               <a:t>8/31/20</a:t>
             </a:fld>
@@ -14187,12 +13932,255 @@
           </a:p>
         </p:txBody>
       </p:sp>
-      <p:sp>
-        <p:nvSpPr>
-          <p:cNvPr id="6" name="Rectangle 5">
+      <p:pic>
+        <p:nvPicPr>
+          <p:cNvPr id="14" name="Picture 13">
             <a:extLst>
               <a:ext uri="{FF2B5EF4-FFF2-40B4-BE49-F238E27FC236}">
-                <a16:creationId xmlns:a16="http://schemas.microsoft.com/office/drawing/2014/main" id="{1D3A9800-C923-F943-ACA5-B4B9B9A1D73D}"/>
+                <a16:creationId xmlns:a16="http://schemas.microsoft.com/office/drawing/2014/main" id="{484BB678-EF03-1E4B-8F08-99BE279810A5}"/>
+              </a:ext>
+            </a:extLst>
+          </p:cNvPr>
+          <p:cNvPicPr>
+            <a:picLocks noChangeAspect="1"/>
+          </p:cNvPicPr>
+          <p:nvPr/>
+        </p:nvPicPr>
+        <p:blipFill>
+          <a:blip r:embed="rId2"/>
+          <a:stretch>
+            <a:fillRect/>
+          </a:stretch>
+        </p:blipFill>
+        <p:spPr>
+          <a:xfrm rot="5400000">
+            <a:off x="7944248" y="-147063"/>
+            <a:ext cx="3012694" cy="4176522"/>
+          </a:xfrm>
+          <a:prstGeom prst="rect">
+            <a:avLst/>
+          </a:prstGeom>
+        </p:spPr>
+      </p:pic>
+      <p:pic>
+        <p:nvPicPr>
+          <p:cNvPr id="16" name="Picture 15">
+            <a:extLst>
+              <a:ext uri="{FF2B5EF4-FFF2-40B4-BE49-F238E27FC236}">
+                <a16:creationId xmlns:a16="http://schemas.microsoft.com/office/drawing/2014/main" id="{9D6EE389-A52D-4F4C-A2D8-E6BDAB28B6D9}"/>
+              </a:ext>
+            </a:extLst>
+          </p:cNvPr>
+          <p:cNvPicPr>
+            <a:picLocks noChangeAspect="1"/>
+          </p:cNvPicPr>
+          <p:nvPr/>
+        </p:nvPicPr>
+        <p:blipFill>
+          <a:blip r:embed="rId3"/>
+          <a:stretch>
+            <a:fillRect/>
+          </a:stretch>
+        </p:blipFill>
+        <p:spPr>
+          <a:xfrm rot="5400000">
+            <a:off x="7944248" y="2883723"/>
+            <a:ext cx="3012694" cy="4176522"/>
+          </a:xfrm>
+          <a:prstGeom prst="rect">
+            <a:avLst/>
+          </a:prstGeom>
+        </p:spPr>
+      </p:pic>
+      <p:sp>
+        <p:nvSpPr>
+          <p:cNvPr id="12" name="TextBox 11">
+            <a:extLst>
+              <a:ext uri="{FF2B5EF4-FFF2-40B4-BE49-F238E27FC236}">
+                <a16:creationId xmlns:a16="http://schemas.microsoft.com/office/drawing/2014/main" id="{0DA88F88-061A-7948-9105-8D7B2578CE9D}"/>
+              </a:ext>
+            </a:extLst>
+          </p:cNvPr>
+          <p:cNvSpPr txBox="1"/>
+          <p:nvPr/>
+        </p:nvSpPr>
+        <p:spPr>
+          <a:xfrm>
+            <a:off x="3752850" y="-76347"/>
+            <a:ext cx="4686300" cy="523220"/>
+          </a:xfrm>
+          <a:prstGeom prst="rect">
+            <a:avLst/>
+          </a:prstGeom>
+          <a:noFill/>
+        </p:spPr>
+        <p:txBody>
+          <a:bodyPr wrap="square" rtlCol="0">
+            <a:spAutoFit/>
+          </a:bodyPr>
+          <a:lstStyle/>
+          <a:p>
+            <a:r>
+              <a:rPr lang="en-GR" sz="2800" u="sng" dirty="0"/>
+              <a:t>TagAndProbe Efficiency </a:t>
+            </a:r>
+            <a:r>
+              <a:rPr lang="en-US" sz="2800" u="sng" dirty="0"/>
+              <a:t>(</a:t>
+            </a:r>
+            <a:r>
+              <a:rPr lang="en-US" sz="2800" u="sng" dirty="0">
+                <a:solidFill>
+                  <a:srgbClr val="00B0F0"/>
+                </a:solidFill>
+              </a:rPr>
+              <a:t>2016</a:t>
+            </a:r>
+            <a:r>
+              <a:rPr lang="en-US" sz="2800" u="sng" dirty="0"/>
+              <a:t>)</a:t>
+            </a:r>
+          </a:p>
+        </p:txBody>
+      </p:sp>
+      <p:pic>
+        <p:nvPicPr>
+          <p:cNvPr id="4" name="Picture 3">
+            <a:extLst>
+              <a:ext uri="{FF2B5EF4-FFF2-40B4-BE49-F238E27FC236}">
+                <a16:creationId xmlns:a16="http://schemas.microsoft.com/office/drawing/2014/main" id="{445DFE14-0581-C04E-BF1A-15D93312C5B0}"/>
+              </a:ext>
+            </a:extLst>
+          </p:cNvPr>
+          <p:cNvPicPr>
+            <a:picLocks noChangeAspect="1"/>
+          </p:cNvPicPr>
+          <p:nvPr/>
+        </p:nvPicPr>
+        <p:blipFill>
+          <a:blip r:embed="rId4"/>
+          <a:stretch>
+            <a:fillRect/>
+          </a:stretch>
+        </p:blipFill>
+        <p:spPr>
+          <a:xfrm rot="5400000">
+            <a:off x="1450594" y="-223701"/>
+            <a:ext cx="3012694" cy="4176522"/>
+          </a:xfrm>
+          <a:prstGeom prst="rect">
+            <a:avLst/>
+          </a:prstGeom>
+        </p:spPr>
+      </p:pic>
+      <p:pic>
+        <p:nvPicPr>
+          <p:cNvPr id="8" name="Picture 7">
+            <a:extLst>
+              <a:ext uri="{FF2B5EF4-FFF2-40B4-BE49-F238E27FC236}">
+                <a16:creationId xmlns:a16="http://schemas.microsoft.com/office/drawing/2014/main" id="{17C44605-60F4-E547-9DEF-B768885A5780}"/>
+              </a:ext>
+            </a:extLst>
+          </p:cNvPr>
+          <p:cNvPicPr>
+            <a:picLocks noChangeAspect="1"/>
+          </p:cNvPicPr>
+          <p:nvPr/>
+        </p:nvPicPr>
+        <p:blipFill>
+          <a:blip r:embed="rId5"/>
+          <a:stretch>
+            <a:fillRect/>
+          </a:stretch>
+        </p:blipFill>
+        <p:spPr>
+          <a:xfrm rot="5400000">
+            <a:off x="1450594" y="2859107"/>
+            <a:ext cx="3012694" cy="4176522"/>
+          </a:xfrm>
+          <a:prstGeom prst="rect">
+            <a:avLst/>
+          </a:prstGeom>
+        </p:spPr>
+      </p:pic>
+      <p:sp>
+        <p:nvSpPr>
+          <p:cNvPr id="22" name="TextBox 21">
+            <a:extLst>
+              <a:ext uri="{FF2B5EF4-FFF2-40B4-BE49-F238E27FC236}">
+                <a16:creationId xmlns:a16="http://schemas.microsoft.com/office/drawing/2014/main" id="{EA21A52B-1999-2A4B-A31D-E57CC60160A2}"/>
+              </a:ext>
+            </a:extLst>
+          </p:cNvPr>
+          <p:cNvSpPr txBox="1"/>
+          <p:nvPr/>
+        </p:nvSpPr>
+        <p:spPr>
+          <a:xfrm>
+            <a:off x="4683689" y="4680680"/>
+            <a:ext cx="3243263" cy="369332"/>
+          </a:xfrm>
+          <a:prstGeom prst="rect">
+            <a:avLst/>
+          </a:prstGeom>
+          <a:noFill/>
+        </p:spPr>
+        <p:txBody>
+          <a:bodyPr wrap="square" rtlCol="0">
+            <a:spAutoFit/>
+          </a:bodyPr>
+          <a:lstStyle/>
+          <a:p>
+            <a:pPr algn="ctr"/>
+            <a:r>
+              <a:rPr lang="en-GR" dirty="0"/>
+              <a:t>Tight TopTagger + Probe</a:t>
+            </a:r>
+          </a:p>
+        </p:txBody>
+      </p:sp>
+      <p:sp>
+        <p:nvSpPr>
+          <p:cNvPr id="19" name="TextBox 18">
+            <a:extLst>
+              <a:ext uri="{FF2B5EF4-FFF2-40B4-BE49-F238E27FC236}">
+                <a16:creationId xmlns:a16="http://schemas.microsoft.com/office/drawing/2014/main" id="{491F4ED5-8A54-D243-B516-026EF6F12778}"/>
+              </a:ext>
+            </a:extLst>
+          </p:cNvPr>
+          <p:cNvSpPr txBox="1"/>
+          <p:nvPr/>
+        </p:nvSpPr>
+        <p:spPr>
+          <a:xfrm>
+            <a:off x="4559413" y="1807989"/>
+            <a:ext cx="3243263" cy="369332"/>
+          </a:xfrm>
+          <a:prstGeom prst="rect">
+            <a:avLst/>
+          </a:prstGeom>
+          <a:noFill/>
+        </p:spPr>
+        <p:txBody>
+          <a:bodyPr wrap="square" rtlCol="0">
+            <a:spAutoFit/>
+          </a:bodyPr>
+          <a:lstStyle/>
+          <a:p>
+            <a:pPr algn="ctr"/>
+            <a:r>
+              <a:rPr lang="en-GR" dirty="0"/>
+              <a:t>Tight TopTagger + SR TopTagger</a:t>
+            </a:r>
+          </a:p>
+        </p:txBody>
+      </p:sp>
+      <p:sp>
+        <p:nvSpPr>
+          <p:cNvPr id="17" name="Rectangle 16">
+            <a:extLst>
+              <a:ext uri="{FF2B5EF4-FFF2-40B4-BE49-F238E27FC236}">
+                <a16:creationId xmlns:a16="http://schemas.microsoft.com/office/drawing/2014/main" id="{77F1A5DE-010C-8A49-9DFD-F714D88BF2CC}"/>
               </a:ext>
             </a:extLst>
           </p:cNvPr>
@@ -14201,8 +14189,8 @@
         </p:nvSpPr>
         <p:spPr>
           <a:xfrm>
-            <a:off x="7939701" y="638586"/>
-            <a:ext cx="2289346" cy="369332"/>
+            <a:off x="2049125" y="3186241"/>
+            <a:ext cx="1520674" cy="369332"/>
           </a:xfrm>
           <a:prstGeom prst="rect">
             <a:avLst/>
@@ -14216,18 +14204,22 @@
           <a:p>
             <a:pPr algn="ctr"/>
             <a:r>
-              <a:rPr lang="en-US" u="sng" dirty="0"/>
-              <a:t>without b tagging SF’s </a:t>
-            </a:r>
-          </a:p>
-        </p:txBody>
-      </p:sp>
-      <p:sp>
-        <p:nvSpPr>
-          <p:cNvPr id="8" name="Rectangle 7">
+              <a:rPr lang="en-US" b="1" u="sng" dirty="0">
+                <a:solidFill>
+                  <a:srgbClr val="FF0000"/>
+                </a:solidFill>
+              </a:rPr>
+              <a:t>b tagging SF’s </a:t>
+            </a:r>
+          </a:p>
+        </p:txBody>
+      </p:sp>
+      <p:sp>
+        <p:nvSpPr>
+          <p:cNvPr id="21" name="Rectangle 20">
             <a:extLst>
               <a:ext uri="{FF2B5EF4-FFF2-40B4-BE49-F238E27FC236}">
-                <a16:creationId xmlns:a16="http://schemas.microsoft.com/office/drawing/2014/main" id="{FE0D63A0-1633-E841-944F-B91BFC6F0FEB}"/>
+                <a16:creationId xmlns:a16="http://schemas.microsoft.com/office/drawing/2014/main" id="{D299BB8B-A7C3-284A-BF5C-C54CD55AAB5A}"/>
               </a:ext>
             </a:extLst>
           </p:cNvPr>
@@ -14236,8 +14228,8 @@
         </p:nvSpPr>
         <p:spPr>
           <a:xfrm>
-            <a:off x="2333415" y="638586"/>
-            <a:ext cx="1499065" cy="369332"/>
+            <a:off x="8457894" y="3204932"/>
+            <a:ext cx="1849289" cy="369332"/>
           </a:xfrm>
           <a:prstGeom prst="rect">
             <a:avLst/>
@@ -14251,228 +14243,12 @@
           <a:p>
             <a:pPr algn="ctr"/>
             <a:r>
-              <a:rPr lang="en-US" u="sng" dirty="0"/>
-              <a:t>b tagging SF’s </a:t>
-            </a:r>
-          </a:p>
-        </p:txBody>
-      </p:sp>
-      <p:sp>
-        <p:nvSpPr>
-          <p:cNvPr id="2" name="Rectangle 1">
-            <a:extLst>
-              <a:ext uri="{FF2B5EF4-FFF2-40B4-BE49-F238E27FC236}">
-                <a16:creationId xmlns:a16="http://schemas.microsoft.com/office/drawing/2014/main" id="{2DC1FF26-71A8-0242-A173-4ED7A7EC3B5E}"/>
-              </a:ext>
-            </a:extLst>
-          </p:cNvPr>
-          <p:cNvSpPr/>
-          <p:nvPr/>
-        </p:nvSpPr>
-        <p:spPr>
-          <a:xfrm>
-            <a:off x="228600" y="1582339"/>
-            <a:ext cx="6096000" cy="3693319"/>
-          </a:xfrm>
-          <a:prstGeom prst="rect">
-            <a:avLst/>
-          </a:prstGeom>
-        </p:spPr>
-        <p:txBody>
-          <a:bodyPr>
-            <a:spAutoFit/>
-          </a:bodyPr>
-          <a:lstStyle/>
-          <a:p>
-            <a:r>
-              <a:rPr lang="en-GR" dirty="0"/>
-              <a:t>Efficiency-- with btagging SF's</a:t>
-            </a:r>
-          </a:p>
-          <a:p>
-            <a:r>
-              <a:rPr lang="en-GR" dirty="0"/>
-              <a:t>eff data: 0.857 ± 0.040</a:t>
-            </a:r>
-          </a:p>
-          <a:p>
-            <a:r>
-              <a:rPr lang="en-GR" b="1" u="sng" dirty="0">
+              <a:rPr lang="en-US" b="1" u="sng" dirty="0">
                 <a:solidFill>
                   <a:srgbClr val="FF0000"/>
                 </a:solidFill>
               </a:rPr>
-              <a:t>eff ttbar: 0.875 ± 0.0072</a:t>
-            </a:r>
-          </a:p>
-          <a:p>
-            <a:r>
-              <a:rPr lang="en-GR" dirty="0"/>
-              <a:t>-----------</a:t>
-            </a:r>
-          </a:p>
-          <a:p>
-            <a:r>
-              <a:rPr lang="en-GR" dirty="0"/>
-              <a:t>Efficiency per Pt region</a:t>
-            </a:r>
-          </a:p>
-          <a:p>
-            <a:r>
-              <a:rPr lang="en-GR" dirty="0"/>
-              <a:t>eff data pT[400-600]: 0.872 ± 0.047</a:t>
-            </a:r>
-          </a:p>
-          <a:p>
-            <a:r>
-              <a:rPr lang="en-GR" dirty="0"/>
-              <a:t>eff ttbar pT[400-600]: 0.874 ± 0.008</a:t>
-            </a:r>
-          </a:p>
-          <a:p>
-            <a:r>
-              <a:rPr lang="en-GR" dirty="0"/>
-              <a:t>-----------</a:t>
-            </a:r>
-          </a:p>
-          <a:p>
-            <a:r>
-              <a:rPr lang="en-GR" dirty="0"/>
-              <a:t>eff data pT[600-800]: 0.795 ± 0.088</a:t>
-            </a:r>
-          </a:p>
-          <a:p>
-            <a:r>
-              <a:rPr lang="en-GR" dirty="0"/>
-              <a:t>eff ttbar pT[600-800]: 0.876 ± 0.018</a:t>
-            </a:r>
-          </a:p>
-          <a:p>
-            <a:r>
-              <a:rPr lang="en-GR" dirty="0"/>
-              <a:t>-----------</a:t>
-            </a:r>
-          </a:p>
-          <a:p>
-            <a:r>
-              <a:rPr lang="en-GR" dirty="0"/>
-              <a:t>eff data pT[800-Inf]: 0.797 ± 0.186</a:t>
-            </a:r>
-          </a:p>
-          <a:p>
-            <a:r>
-              <a:rPr lang="en-GR" dirty="0"/>
-              <a:t>eff ttbar pT[800-Inf]: 0.899 ± 0.045</a:t>
-            </a:r>
-          </a:p>
-        </p:txBody>
-      </p:sp>
-      <p:sp>
-        <p:nvSpPr>
-          <p:cNvPr id="4" name="Rectangle 3">
-            <a:extLst>
-              <a:ext uri="{FF2B5EF4-FFF2-40B4-BE49-F238E27FC236}">
-                <a16:creationId xmlns:a16="http://schemas.microsoft.com/office/drawing/2014/main" id="{17DD903E-E2EE-ED4A-B9BA-6BDA6FAA4776}"/>
-              </a:ext>
-            </a:extLst>
-          </p:cNvPr>
-          <p:cNvSpPr/>
-          <p:nvPr/>
-        </p:nvSpPr>
-        <p:spPr>
-          <a:xfrm>
-            <a:off x="6852458" y="1582339"/>
-            <a:ext cx="6096000" cy="3693319"/>
-          </a:xfrm>
-          <a:prstGeom prst="rect">
-            <a:avLst/>
-          </a:prstGeom>
-        </p:spPr>
-        <p:txBody>
-          <a:bodyPr>
-            <a:spAutoFit/>
-          </a:bodyPr>
-          <a:lstStyle/>
-          <a:p>
-            <a:r>
-              <a:rPr lang="en-GR" dirty="0"/>
-              <a:t>Efficiency-- without btagging SF's</a:t>
-            </a:r>
-          </a:p>
-          <a:p>
-            <a:r>
-              <a:rPr lang="en-GR" dirty="0"/>
-              <a:t>eff data: 0.864 ± 0.043</a:t>
-            </a:r>
-          </a:p>
-          <a:p>
-            <a:r>
-              <a:rPr lang="en-GR" dirty="0">
-                <a:solidFill>
-                  <a:srgbClr val="FF0000"/>
-                </a:solidFill>
-              </a:rPr>
-              <a:t>eff ttbar: 0.875 ± 0.007</a:t>
-            </a:r>
-          </a:p>
-          <a:p>
-            <a:r>
-              <a:rPr lang="en-GR" dirty="0"/>
-              <a:t>-----------</a:t>
-            </a:r>
-          </a:p>
-          <a:p>
-            <a:r>
-              <a:rPr lang="en-GR" dirty="0"/>
-              <a:t>Efficiency per Pt region</a:t>
-            </a:r>
-          </a:p>
-          <a:p>
-            <a:r>
-              <a:rPr lang="en-GR" dirty="0"/>
-              <a:t>eff data pT[400-600]: 0.880 ± 0.049</a:t>
-            </a:r>
-          </a:p>
-          <a:p>
-            <a:r>
-              <a:rPr lang="en-GR" dirty="0"/>
-              <a:t>eff ttbar pT[400-600]: 0.874 ± 0.008</a:t>
-            </a:r>
-          </a:p>
-          <a:p>
-            <a:r>
-              <a:rPr lang="en-GR" dirty="0"/>
-              <a:t>-----------</a:t>
-            </a:r>
-          </a:p>
-          <a:p>
-            <a:r>
-              <a:rPr lang="en-GR" dirty="0"/>
-              <a:t>eff data pT[600-800]: 0.8 ± 0.091</a:t>
-            </a:r>
-          </a:p>
-          <a:p>
-            <a:r>
-              <a:rPr lang="en-GR" dirty="0"/>
-              <a:t>eff ttbar pT[600-800]: 0.876 ± 0.018</a:t>
-            </a:r>
-          </a:p>
-          <a:p>
-            <a:r>
-              <a:rPr lang="en-GR" dirty="0"/>
-              <a:t>-----------</a:t>
-            </a:r>
-          </a:p>
-          <a:p>
-            <a:r>
-              <a:rPr lang="en-GR" dirty="0"/>
-              <a:t>eff data pT[800-Inf]: 0.796 ± 0.2</a:t>
-            </a:r>
-          </a:p>
-          <a:p>
-            <a:r>
-              <a:rPr lang="en-GR" dirty="0"/>
-              <a:t>eff ttbar pT[800-Inf]: 0.898 ± 0.045</a:t>
+              <a:t>No b tagging SF’s </a:t>
             </a:r>
           </a:p>
         </p:txBody>
@@ -14480,7 +14256,7 @@
     </p:spTree>
     <p:extLst>
       <p:ext uri="{BB962C8B-B14F-4D97-AF65-F5344CB8AC3E}">
-        <p14:creationId xmlns:p14="http://schemas.microsoft.com/office/powerpoint/2010/main" val="305433567"/>
+        <p14:creationId xmlns:p14="http://schemas.microsoft.com/office/powerpoint/2010/main" val="2146348735"/>
       </p:ext>
     </p:extLst>
   </p:cSld>
@@ -14564,10 +14340,10 @@
             <a:r>
               <a:rPr lang="en-US" sz="2800" u="sng" dirty="0">
                 <a:solidFill>
-                  <a:srgbClr val="00B050"/>
+                  <a:srgbClr val="FF0000"/>
                 </a:solidFill>
               </a:rPr>
-              <a:t>2018</a:t>
+              <a:t>2017</a:t>
             </a:r>
             <a:r>
               <a:rPr lang="en-US" sz="2800" u="sng" dirty="0"/>
@@ -14715,7 +14491,7 @@
           <p:cNvPr id="2" name="Rectangle 1">
             <a:extLst>
               <a:ext uri="{FF2B5EF4-FFF2-40B4-BE49-F238E27FC236}">
-                <a16:creationId xmlns:a16="http://schemas.microsoft.com/office/drawing/2014/main" id="{5C0AC30A-7E8B-5E44-B107-1CFE415896F6}"/>
+                <a16:creationId xmlns:a16="http://schemas.microsoft.com/office/drawing/2014/main" id="{2DC1FF26-71A8-0242-A173-4ED7A7EC3B5E}"/>
               </a:ext>
             </a:extLst>
           </p:cNvPr>
@@ -14724,45 +14500,38 @@
         </p:nvSpPr>
         <p:spPr>
           <a:xfrm>
-            <a:off x="228600" y="1582340"/>
-            <a:ext cx="6096000" cy="3693319"/>
+            <a:off x="1211284" y="1582339"/>
+            <a:ext cx="3743325" cy="3693319"/>
           </a:xfrm>
           <a:prstGeom prst="rect">
             <a:avLst/>
           </a:prstGeom>
         </p:spPr>
         <p:txBody>
-          <a:bodyPr>
+          <a:bodyPr wrap="square">
             <a:spAutoFit/>
           </a:bodyPr>
           <a:lstStyle/>
           <a:p>
             <a:r>
               <a:rPr lang="en-GR" dirty="0"/>
-              <a:t>Efficiency-- with tag SF's</a:t>
-            </a:r>
-          </a:p>
-          <a:p>
-            <a:r>
-              <a:rPr lang="en-GR" dirty="0">
+              <a:t>Efficiency-- with btagging SF's</a:t>
+            </a:r>
+          </a:p>
+          <a:p>
+            <a:r>
+              <a:rPr lang="en-GR" dirty="0"/>
+              <a:t>eff data: 0.857 ± 0.040</a:t>
+            </a:r>
+          </a:p>
+          <a:p>
+            <a:r>
+              <a:rPr lang="en-GR" b="1" u="sng" dirty="0">
                 <a:solidFill>
-                  <a:schemeClr val="tx1">
-                    <a:lumMod val="95000"/>
-                    <a:lumOff val="5000"/>
-                  </a:schemeClr>
+                  <a:srgbClr val="FF0000"/>
                 </a:solidFill>
               </a:rPr>
-              <a:t>eff data: 0.816 ± 0.032</a:t>
-            </a:r>
-          </a:p>
-          <a:p>
-            <a:r>
-              <a:rPr lang="en-GR" b="1" u="sng" dirty="0">
-                <a:solidFill>
-                  <a:srgbClr val="00B050"/>
-                </a:solidFill>
-              </a:rPr>
-              <a:t>eff ttbar: 0.839 ± 0.005</a:t>
+              <a:t>eff ttbar: 0.875 ± 0.0072</a:t>
             </a:r>
           </a:p>
           <a:p>
@@ -14780,13 +14549,13 @@
           <a:p>
             <a:r>
               <a:rPr lang="en-GR" dirty="0"/>
-              <a:t>eff data pT[400-600]: 0.8176 ± 0.038</a:t>
+              <a:t>eff data pT[400-600]: 0.872 ± 0.047</a:t>
             </a:r>
           </a:p>
           <a:p>
             <a:r>
               <a:rPr lang="en-GR" dirty="0"/>
-              <a:t>eff ttbar pT[400-600]: 0.837 ± 0.006</a:t>
+              <a:t>eff ttbar pT[400-600]: 0.874 ± 0.008</a:t>
             </a:r>
           </a:p>
           <a:p>
@@ -14798,13 +14567,13 @@
           <a:p>
             <a:r>
               <a:rPr lang="en-GR" dirty="0"/>
-              <a:t>eff data pT[600-800]: 0.809 ± 0.063</a:t>
+              <a:t>eff data pT[600-800]: 0.795 ± 0.088</a:t>
             </a:r>
           </a:p>
           <a:p>
             <a:r>
               <a:rPr lang="en-GR" dirty="0"/>
-              <a:t>eff ttbar pT[600-800]: 0.847 ± 0.013</a:t>
+              <a:t>eff ttbar pT[600-800]: 0.876 ± 0.018</a:t>
             </a:r>
           </a:p>
           <a:p>
@@ -14816,13 +14585,13 @@
           <a:p>
             <a:r>
               <a:rPr lang="en-GR" dirty="0"/>
-              <a:t>eff data pT[800-Inf]: 0.772 ± 0.132</a:t>
+              <a:t>eff data pT[800-Inf]: 0.797 ± 0.186</a:t>
             </a:r>
           </a:p>
           <a:p>
             <a:r>
               <a:rPr lang="en-GR" dirty="0"/>
-              <a:t>eff ttbar pT[800-Inf]: 0.868 ± 0.032</a:t>
+              <a:t>eff ttbar pT[800-Inf]: 0.899 ± 0.045</a:t>
             </a:r>
           </a:p>
         </p:txBody>
@@ -14832,7 +14601,7 @@
           <p:cNvPr id="4" name="Rectangle 3">
             <a:extLst>
               <a:ext uri="{FF2B5EF4-FFF2-40B4-BE49-F238E27FC236}">
-                <a16:creationId xmlns:a16="http://schemas.microsoft.com/office/drawing/2014/main" id="{6A55B372-F163-CB40-91A8-4182F6465250}"/>
+                <a16:creationId xmlns:a16="http://schemas.microsoft.com/office/drawing/2014/main" id="{17DD903E-E2EE-ED4A-B9BA-6BDA6FAA4776}"/>
               </a:ext>
             </a:extLst>
           </p:cNvPr>
@@ -14841,45 +14610,38 @@
         </p:nvSpPr>
         <p:spPr>
           <a:xfrm>
-            <a:off x="6096000" y="1582339"/>
-            <a:ext cx="6096000" cy="3693319"/>
+            <a:off x="7212711" y="1582339"/>
+            <a:ext cx="3743325" cy="3693319"/>
           </a:xfrm>
           <a:prstGeom prst="rect">
             <a:avLst/>
           </a:prstGeom>
         </p:spPr>
         <p:txBody>
-          <a:bodyPr>
+          <a:bodyPr wrap="square">
             <a:spAutoFit/>
           </a:bodyPr>
           <a:lstStyle/>
           <a:p>
             <a:r>
               <a:rPr lang="en-GR" dirty="0"/>
-              <a:t>Efficiency-- without tag sf's</a:t>
+              <a:t>Efficiency-- without btagging SF's</a:t>
+            </a:r>
+          </a:p>
+          <a:p>
+            <a:r>
+              <a:rPr lang="en-GR" dirty="0"/>
+              <a:t>eff data: 0.864 ± 0.043</a:t>
             </a:r>
           </a:p>
           <a:p>
             <a:r>
               <a:rPr lang="en-GR" dirty="0">
                 <a:solidFill>
-                  <a:schemeClr val="tx1">
-                    <a:lumMod val="95000"/>
-                    <a:lumOff val="5000"/>
-                  </a:schemeClr>
+                  <a:srgbClr val="FF0000"/>
                 </a:solidFill>
               </a:rPr>
-              <a:t>eff data: 0.822 ± 0.034</a:t>
-            </a:r>
-          </a:p>
-          <a:p>
-            <a:r>
-              <a:rPr lang="en-GR" dirty="0">
-                <a:solidFill>
-                  <a:srgbClr val="00B050"/>
-                </a:solidFill>
-              </a:rPr>
-              <a:t>eff ttbar: 0.839 ± 0.005</a:t>
+              <a:t>eff ttbar: 0.875 ± 0.007</a:t>
             </a:r>
           </a:p>
           <a:p>
@@ -14897,13 +14659,13 @@
           <a:p>
             <a:r>
               <a:rPr lang="en-GR" dirty="0"/>
-              <a:t>eff data pT[400-600]: 0.824 ± 0.039</a:t>
+              <a:t>eff data pT[400-600]: 0.880 ± 0.049</a:t>
             </a:r>
           </a:p>
           <a:p>
             <a:r>
               <a:rPr lang="en-GR" dirty="0"/>
-              <a:t>eff ttbar pT[400-600]: 0.837 ± 0.006</a:t>
+              <a:t>eff ttbar pT[400-600]: 0.874 ± 0.008</a:t>
             </a:r>
           </a:p>
           <a:p>
@@ -14915,13 +14677,13 @@
           <a:p>
             <a:r>
               <a:rPr lang="en-GR" dirty="0"/>
-              <a:t>eff data pT[600-800]: 0.819 ± 0.066</a:t>
+              <a:t>eff data pT[600-800]: 0.8 ± 0.091</a:t>
             </a:r>
           </a:p>
           <a:p>
             <a:r>
               <a:rPr lang="en-GR" dirty="0"/>
-              <a:t>eff ttbar pT[600-800]: 0.847 ± 0.013</a:t>
+              <a:t>eff ttbar pT[600-800]: 0.876 ± 0.018</a:t>
             </a:r>
           </a:p>
           <a:p>
@@ -14933,13 +14695,13 @@
           <a:p>
             <a:r>
               <a:rPr lang="en-GR" dirty="0"/>
-              <a:t>eff data pT[800-Inf]: 0.789 ± 0.141</a:t>
+              <a:t>eff data pT[800-Inf]: 0.796 ± 0.2</a:t>
             </a:r>
           </a:p>
           <a:p>
             <a:r>
               <a:rPr lang="en-GR" dirty="0"/>
-              <a:t>eff ttbar pT[800-Inf]: 0.868 ± 0.032</a:t>
+              <a:t>eff ttbar pT[800-Inf]: 0.898 ± 0.045</a:t>
             </a:r>
           </a:p>
         </p:txBody>
@@ -14947,7 +14709,7 @@
     </p:spTree>
     <p:extLst>
       <p:ext uri="{BB962C8B-B14F-4D97-AF65-F5344CB8AC3E}">
-        <p14:creationId xmlns:p14="http://schemas.microsoft.com/office/powerpoint/2010/main" val="4027163055"/>
+        <p14:creationId xmlns:p14="http://schemas.microsoft.com/office/powerpoint/2010/main" val="305433567"/>
       </p:ext>
     </p:extLst>
   </p:cSld>
@@ -15003,53 +14765,6 @@
       </p:sp>
       <p:sp>
         <p:nvSpPr>
-          <p:cNvPr id="7" name="TextBox 6"/>
-          <p:cNvSpPr txBox="1"/>
-          <p:nvPr/>
-        </p:nvSpPr>
-        <p:spPr>
-          <a:xfrm>
-            <a:off x="2805007" y="33090"/>
-            <a:ext cx="6581985" cy="523220"/>
-          </a:xfrm>
-          <a:prstGeom prst="rect">
-            <a:avLst/>
-          </a:prstGeom>
-          <a:noFill/>
-        </p:spPr>
-        <p:txBody>
-          <a:bodyPr wrap="square" rtlCol="0">
-            <a:spAutoFit/>
-          </a:bodyPr>
-          <a:lstStyle/>
-          <a:p>
-            <a:pPr algn="ctr"/>
-            <a:r>
-              <a:rPr lang="en-US" sz="2800" u="sng" dirty="0"/>
-              <a:t>Data Vs MC Stacks for BDT output </a:t>
-            </a:r>
-            <a:r>
-              <a:rPr lang="en-US" sz="2800" u="sng" dirty="0">
-                <a:solidFill>
-                  <a:srgbClr val="00B0F0"/>
-                </a:solidFill>
-              </a:rPr>
-              <a:t>2016</a:t>
-            </a:r>
-            <a:r>
-              <a:rPr lang="en-US" sz="2800" u="sng" dirty="0"/>
-              <a:t> </a:t>
-            </a:r>
-            <a:endParaRPr lang="en-US" sz="2800" u="sng" dirty="0">
-              <a:solidFill>
-                <a:srgbClr val="00B050"/>
-              </a:solidFill>
-            </a:endParaRPr>
-          </a:p>
-        </p:txBody>
-      </p:sp>
-      <p:sp>
-        <p:nvSpPr>
           <p:cNvPr id="5" name="Slide Number Placeholder 4">
             <a:extLst>
               <a:ext uri="{FF2B5EF4-FFF2-40B4-BE49-F238E27FC236}">
@@ -15099,7 +14814,7 @@
           <a:bodyPr/>
           <a:lstStyle/>
           <a:p>
-            <a:fld id="{3DBB7BD0-9B8D-1F47-8ABF-BE3CF9BD2848}" type="datetime1">
+            <a:fld id="{D52D66B2-0E0A-F441-A1DA-8039F615D612}" type="datetime1">
               <a:rPr lang="en-US" smtClean="0"/>
               <a:t>8/31/20</a:t>
             </a:fld>
@@ -15107,82 +14822,12 @@
           </a:p>
         </p:txBody>
       </p:sp>
-      <p:sp>
-        <p:nvSpPr>
-          <p:cNvPr id="6" name="Rectangle 5">
+      <p:pic>
+        <p:nvPicPr>
+          <p:cNvPr id="6" name="Picture 5">
             <a:extLst>
               <a:ext uri="{FF2B5EF4-FFF2-40B4-BE49-F238E27FC236}">
-                <a16:creationId xmlns:a16="http://schemas.microsoft.com/office/drawing/2014/main" id="{1D3A9800-C923-F943-ACA5-B4B9B9A1D73D}"/>
-              </a:ext>
-            </a:extLst>
-          </p:cNvPr>
-          <p:cNvSpPr/>
-          <p:nvPr/>
-        </p:nvSpPr>
-        <p:spPr>
-          <a:xfrm>
-            <a:off x="7939701" y="638586"/>
-            <a:ext cx="2289346" cy="369332"/>
-          </a:xfrm>
-          <a:prstGeom prst="rect">
-            <a:avLst/>
-          </a:prstGeom>
-        </p:spPr>
-        <p:txBody>
-          <a:bodyPr wrap="none">
-            <a:spAutoFit/>
-          </a:bodyPr>
-          <a:lstStyle/>
-          <a:p>
-            <a:pPr algn="ctr"/>
-            <a:r>
-              <a:rPr lang="en-US" u="sng" dirty="0"/>
-              <a:t>without b tagging SF’s </a:t>
-            </a:r>
-          </a:p>
-        </p:txBody>
-      </p:sp>
-      <p:sp>
-        <p:nvSpPr>
-          <p:cNvPr id="8" name="Rectangle 7">
-            <a:extLst>
-              <a:ext uri="{FF2B5EF4-FFF2-40B4-BE49-F238E27FC236}">
-                <a16:creationId xmlns:a16="http://schemas.microsoft.com/office/drawing/2014/main" id="{FE0D63A0-1633-E841-944F-B91BFC6F0FEB}"/>
-              </a:ext>
-            </a:extLst>
-          </p:cNvPr>
-          <p:cNvSpPr/>
-          <p:nvPr/>
-        </p:nvSpPr>
-        <p:spPr>
-          <a:xfrm>
-            <a:off x="2333415" y="638586"/>
-            <a:ext cx="1499065" cy="369332"/>
-          </a:xfrm>
-          <a:prstGeom prst="rect">
-            <a:avLst/>
-          </a:prstGeom>
-        </p:spPr>
-        <p:txBody>
-          <a:bodyPr wrap="none">
-            <a:spAutoFit/>
-          </a:bodyPr>
-          <a:lstStyle/>
-          <a:p>
-            <a:pPr algn="ctr"/>
-            <a:r>
-              <a:rPr lang="en-US" u="sng" dirty="0"/>
-              <a:t>b tagging SF’s </a:t>
-            </a:r>
-          </a:p>
-        </p:txBody>
-      </p:sp>
-      <p:pic>
-        <p:nvPicPr>
-          <p:cNvPr id="16" name="Picture 15">
-            <a:extLst>
-              <a:ext uri="{FF2B5EF4-FFF2-40B4-BE49-F238E27FC236}">
-                <a16:creationId xmlns:a16="http://schemas.microsoft.com/office/drawing/2014/main" id="{5D8E6EFC-97AF-244B-A2EE-506157EAA619}"/>
+                <a16:creationId xmlns:a16="http://schemas.microsoft.com/office/drawing/2014/main" id="{76577AAD-70A0-9B43-8DBE-57FA2136BB3A}"/>
               </a:ext>
             </a:extLst>
           </p:cNvPr>
@@ -15199,18 +14844,309 @@
         </p:blipFill>
         <p:spPr>
           <a:xfrm rot="5400000">
-            <a:off x="1096075" y="0"/>
-            <a:ext cx="4946952" cy="6858000"/>
+            <a:off x="7709105" y="-192065"/>
+            <a:ext cx="3012694" cy="4176522"/>
           </a:xfrm>
           <a:prstGeom prst="rect">
             <a:avLst/>
           </a:prstGeom>
         </p:spPr>
       </p:pic>
+      <p:pic>
+        <p:nvPicPr>
+          <p:cNvPr id="9" name="Picture 8">
+            <a:extLst>
+              <a:ext uri="{FF2B5EF4-FFF2-40B4-BE49-F238E27FC236}">
+                <a16:creationId xmlns:a16="http://schemas.microsoft.com/office/drawing/2014/main" id="{E69FA34F-44BB-8144-9394-18EA05CD1FF7}"/>
+              </a:ext>
+            </a:extLst>
+          </p:cNvPr>
+          <p:cNvPicPr>
+            <a:picLocks noChangeAspect="1"/>
+          </p:cNvPicPr>
+          <p:nvPr/>
+        </p:nvPicPr>
+        <p:blipFill>
+          <a:blip r:embed="rId3"/>
+          <a:stretch>
+            <a:fillRect/>
+          </a:stretch>
+        </p:blipFill>
+        <p:spPr>
+          <a:xfrm rot="5400000">
+            <a:off x="7711792" y="2820629"/>
+            <a:ext cx="3012694" cy="4176522"/>
+          </a:xfrm>
+          <a:prstGeom prst="rect">
+            <a:avLst/>
+          </a:prstGeom>
+        </p:spPr>
+      </p:pic>
+      <p:sp>
+        <p:nvSpPr>
+          <p:cNvPr id="12" name="TextBox 11">
+            <a:extLst>
+              <a:ext uri="{FF2B5EF4-FFF2-40B4-BE49-F238E27FC236}">
+                <a16:creationId xmlns:a16="http://schemas.microsoft.com/office/drawing/2014/main" id="{9235591C-B2E3-1F4E-A8D0-58AEACB0FD0A}"/>
+              </a:ext>
+            </a:extLst>
+          </p:cNvPr>
+          <p:cNvSpPr txBox="1"/>
+          <p:nvPr/>
+        </p:nvSpPr>
+        <p:spPr>
+          <a:xfrm>
+            <a:off x="3752850" y="-76347"/>
+            <a:ext cx="4686300" cy="523220"/>
+          </a:xfrm>
+          <a:prstGeom prst="rect">
+            <a:avLst/>
+          </a:prstGeom>
+          <a:noFill/>
+        </p:spPr>
+        <p:txBody>
+          <a:bodyPr wrap="square" rtlCol="0">
+            <a:spAutoFit/>
+          </a:bodyPr>
+          <a:lstStyle/>
+          <a:p>
+            <a:r>
+              <a:rPr lang="en-GR" sz="2800" u="sng" dirty="0"/>
+              <a:t>TagAndProbe Efficiency </a:t>
+            </a:r>
+            <a:r>
+              <a:rPr lang="en-US" sz="2800" u="sng" dirty="0"/>
+              <a:t>(</a:t>
+            </a:r>
+            <a:r>
+              <a:rPr lang="en-US" sz="2800" u="sng" dirty="0">
+                <a:solidFill>
+                  <a:srgbClr val="FF0000"/>
+                </a:solidFill>
+              </a:rPr>
+              <a:t>2017</a:t>
+            </a:r>
+            <a:r>
+              <a:rPr lang="en-US" sz="2800" u="sng" dirty="0"/>
+              <a:t>)</a:t>
+            </a:r>
+          </a:p>
+        </p:txBody>
+      </p:sp>
+      <p:pic>
+        <p:nvPicPr>
+          <p:cNvPr id="4" name="Picture 3">
+            <a:extLst>
+              <a:ext uri="{FF2B5EF4-FFF2-40B4-BE49-F238E27FC236}">
+                <a16:creationId xmlns:a16="http://schemas.microsoft.com/office/drawing/2014/main" id="{2A0B0CBB-9430-DB4A-8230-417D7635DCEF}"/>
+              </a:ext>
+            </a:extLst>
+          </p:cNvPr>
+          <p:cNvPicPr>
+            <a:picLocks noChangeAspect="1"/>
+          </p:cNvPicPr>
+          <p:nvPr/>
+        </p:nvPicPr>
+        <p:blipFill>
+          <a:blip r:embed="rId4"/>
+          <a:stretch>
+            <a:fillRect/>
+          </a:stretch>
+        </p:blipFill>
+        <p:spPr>
+          <a:xfrm rot="5400000">
+            <a:off x="1341824" y="-192065"/>
+            <a:ext cx="3012694" cy="4176522"/>
+          </a:xfrm>
+          <a:prstGeom prst="rect">
+            <a:avLst/>
+          </a:prstGeom>
+        </p:spPr>
+      </p:pic>
+      <p:pic>
+        <p:nvPicPr>
+          <p:cNvPr id="10" name="Picture 9">
+            <a:extLst>
+              <a:ext uri="{FF2B5EF4-FFF2-40B4-BE49-F238E27FC236}">
+                <a16:creationId xmlns:a16="http://schemas.microsoft.com/office/drawing/2014/main" id="{C82386EE-D7CA-224B-9B0C-7F5E3D376BCD}"/>
+              </a:ext>
+            </a:extLst>
+          </p:cNvPr>
+          <p:cNvPicPr>
+            <a:picLocks noChangeAspect="1"/>
+          </p:cNvPicPr>
+          <p:nvPr/>
+        </p:nvPicPr>
+        <p:blipFill>
+          <a:blip r:embed="rId5"/>
+          <a:stretch>
+            <a:fillRect/>
+          </a:stretch>
+        </p:blipFill>
+        <p:spPr>
+          <a:xfrm rot="5400000">
+            <a:off x="1341824" y="2820629"/>
+            <a:ext cx="3012694" cy="4176522"/>
+          </a:xfrm>
+          <a:prstGeom prst="rect">
+            <a:avLst/>
+          </a:prstGeom>
+        </p:spPr>
+      </p:pic>
+      <p:sp>
+        <p:nvSpPr>
+          <p:cNvPr id="17" name="TextBox 16">
+            <a:extLst>
+              <a:ext uri="{FF2B5EF4-FFF2-40B4-BE49-F238E27FC236}">
+                <a16:creationId xmlns:a16="http://schemas.microsoft.com/office/drawing/2014/main" id="{2CCEE914-8706-CD47-AD02-11049E45D610}"/>
+              </a:ext>
+            </a:extLst>
+          </p:cNvPr>
+          <p:cNvSpPr txBox="1"/>
+          <p:nvPr/>
+        </p:nvSpPr>
+        <p:spPr>
+          <a:xfrm>
+            <a:off x="4564347" y="1926143"/>
+            <a:ext cx="3243263" cy="369332"/>
+          </a:xfrm>
+          <a:prstGeom prst="rect">
+            <a:avLst/>
+          </a:prstGeom>
+          <a:noFill/>
+        </p:spPr>
+        <p:txBody>
+          <a:bodyPr wrap="square" rtlCol="0">
+            <a:spAutoFit/>
+          </a:bodyPr>
+          <a:lstStyle/>
+          <a:p>
+            <a:pPr algn="ctr"/>
+            <a:r>
+              <a:rPr lang="en-GR" dirty="0"/>
+              <a:t>Tight TopTagger + SR TopTagger</a:t>
+            </a:r>
+          </a:p>
+        </p:txBody>
+      </p:sp>
+      <p:sp>
+        <p:nvSpPr>
+          <p:cNvPr id="18" name="TextBox 17">
+            <a:extLst>
+              <a:ext uri="{FF2B5EF4-FFF2-40B4-BE49-F238E27FC236}">
+                <a16:creationId xmlns:a16="http://schemas.microsoft.com/office/drawing/2014/main" id="{6C7E105D-5296-2242-84F9-5547FDE0873C}"/>
+              </a:ext>
+            </a:extLst>
+          </p:cNvPr>
+          <p:cNvSpPr txBox="1"/>
+          <p:nvPr/>
+        </p:nvSpPr>
+        <p:spPr>
+          <a:xfrm>
+            <a:off x="4564348" y="4747191"/>
+            <a:ext cx="3243263" cy="369332"/>
+          </a:xfrm>
+          <a:prstGeom prst="rect">
+            <a:avLst/>
+          </a:prstGeom>
+          <a:noFill/>
+        </p:spPr>
+        <p:txBody>
+          <a:bodyPr wrap="square" rtlCol="0">
+            <a:spAutoFit/>
+          </a:bodyPr>
+          <a:lstStyle/>
+          <a:p>
+            <a:pPr algn="ctr"/>
+            <a:r>
+              <a:rPr lang="en-GR" dirty="0"/>
+              <a:t>Tight TopTagger + Probe</a:t>
+            </a:r>
+          </a:p>
+        </p:txBody>
+      </p:sp>
+      <p:sp>
+        <p:nvSpPr>
+          <p:cNvPr id="19" name="Rectangle 18">
+            <a:extLst>
+              <a:ext uri="{FF2B5EF4-FFF2-40B4-BE49-F238E27FC236}">
+                <a16:creationId xmlns:a16="http://schemas.microsoft.com/office/drawing/2014/main" id="{F18E505C-0E8D-5D4F-9340-1B44147C83AA}"/>
+              </a:ext>
+            </a:extLst>
+          </p:cNvPr>
+          <p:cNvSpPr/>
+          <p:nvPr/>
+        </p:nvSpPr>
+        <p:spPr>
+          <a:xfrm>
+            <a:off x="2049125" y="3186241"/>
+            <a:ext cx="1520674" cy="369332"/>
+          </a:xfrm>
+          <a:prstGeom prst="rect">
+            <a:avLst/>
+          </a:prstGeom>
+        </p:spPr>
+        <p:txBody>
+          <a:bodyPr wrap="none">
+            <a:spAutoFit/>
+          </a:bodyPr>
+          <a:lstStyle/>
+          <a:p>
+            <a:pPr algn="ctr"/>
+            <a:r>
+              <a:rPr lang="en-US" b="1" u="sng" dirty="0">
+                <a:solidFill>
+                  <a:srgbClr val="FF0000"/>
+                </a:solidFill>
+              </a:rPr>
+              <a:t>b tagging SF’s </a:t>
+            </a:r>
+          </a:p>
+        </p:txBody>
+      </p:sp>
+      <p:sp>
+        <p:nvSpPr>
+          <p:cNvPr id="20" name="Rectangle 19">
+            <a:extLst>
+              <a:ext uri="{FF2B5EF4-FFF2-40B4-BE49-F238E27FC236}">
+                <a16:creationId xmlns:a16="http://schemas.microsoft.com/office/drawing/2014/main" id="{67D4E5C2-0B92-0048-8D4F-4E4A55880973}"/>
+              </a:ext>
+            </a:extLst>
+          </p:cNvPr>
+          <p:cNvSpPr/>
+          <p:nvPr/>
+        </p:nvSpPr>
+        <p:spPr>
+          <a:xfrm>
+            <a:off x="8457894" y="3204932"/>
+            <a:ext cx="1849289" cy="369332"/>
+          </a:xfrm>
+          <a:prstGeom prst="rect">
+            <a:avLst/>
+          </a:prstGeom>
+        </p:spPr>
+        <p:txBody>
+          <a:bodyPr wrap="none">
+            <a:spAutoFit/>
+          </a:bodyPr>
+          <a:lstStyle/>
+          <a:p>
+            <a:pPr algn="ctr"/>
+            <a:r>
+              <a:rPr lang="en-US" b="1" u="sng" dirty="0">
+                <a:solidFill>
+                  <a:srgbClr val="FF0000"/>
+                </a:solidFill>
+              </a:rPr>
+              <a:t>No b tagging SF’s </a:t>
+            </a:r>
+          </a:p>
+        </p:txBody>
+      </p:sp>
     </p:spTree>
     <p:extLst>
       <p:ext uri="{BB962C8B-B14F-4D97-AF65-F5344CB8AC3E}">
-        <p14:creationId xmlns:p14="http://schemas.microsoft.com/office/powerpoint/2010/main" val="83094305"/>
+        <p14:creationId xmlns:p14="http://schemas.microsoft.com/office/powerpoint/2010/main" val="4150945209"/>
       </p:ext>
     </p:extLst>
   </p:cSld>
@@ -15272,8 +15208,8 @@
         </p:nvSpPr>
         <p:spPr>
           <a:xfrm>
-            <a:off x="2805007" y="33090"/>
-            <a:ext cx="6581985" cy="523220"/>
+            <a:off x="3276600" y="33090"/>
+            <a:ext cx="5638800" cy="523220"/>
           </a:xfrm>
           <a:prstGeom prst="rect">
             <a:avLst/>
@@ -15289,15 +15225,15 @@
             <a:pPr algn="ctr"/>
             <a:r>
               <a:rPr lang="en-US" sz="2800" u="sng" dirty="0"/>
-              <a:t>Data Vs MC Stacks for BDT output </a:t>
+              <a:t>Tag And Probe Calculations </a:t>
             </a:r>
             <a:r>
               <a:rPr lang="en-US" sz="2800" u="sng" dirty="0">
                 <a:solidFill>
-                  <a:srgbClr val="FF0000"/>
+                  <a:srgbClr val="00B050"/>
                 </a:solidFill>
               </a:rPr>
-              <a:t>2017</a:t>
+              <a:t>2018</a:t>
             </a:r>
             <a:r>
               <a:rPr lang="en-US" sz="2800" u="sng" dirty="0"/>
@@ -15440,40 +15376,244 @@
           </a:p>
         </p:txBody>
       </p:sp>
-      <p:pic>
-        <p:nvPicPr>
-          <p:cNvPr id="9" name="Picture 8">
+      <p:sp>
+        <p:nvSpPr>
+          <p:cNvPr id="2" name="Rectangle 1">
             <a:extLst>
               <a:ext uri="{FF2B5EF4-FFF2-40B4-BE49-F238E27FC236}">
-                <a16:creationId xmlns:a16="http://schemas.microsoft.com/office/drawing/2014/main" id="{13D08969-8D76-0B4A-9D6A-3E49FD898264}"/>
+                <a16:creationId xmlns:a16="http://schemas.microsoft.com/office/drawing/2014/main" id="{5C0AC30A-7E8B-5E44-B107-1CFE415896F6}"/>
               </a:ext>
             </a:extLst>
           </p:cNvPr>
-          <p:cNvPicPr>
-            <a:picLocks noChangeAspect="1"/>
-          </p:cNvPicPr>
+          <p:cNvSpPr/>
           <p:nvPr/>
-        </p:nvPicPr>
-        <p:blipFill>
-          <a:blip r:embed="rId2"/>
-          <a:stretch>
-            <a:fillRect/>
-          </a:stretch>
-        </p:blipFill>
-        <p:spPr>
-          <a:xfrm rot="5400000">
-            <a:off x="955524" y="105701"/>
-            <a:ext cx="4946952" cy="6858000"/>
+        </p:nvSpPr>
+        <p:spPr>
+          <a:xfrm>
+            <a:off x="1180718" y="1582339"/>
+            <a:ext cx="3804458" cy="3693319"/>
           </a:xfrm>
           <a:prstGeom prst="rect">
             <a:avLst/>
           </a:prstGeom>
         </p:spPr>
-      </p:pic>
+        <p:txBody>
+          <a:bodyPr wrap="square">
+            <a:spAutoFit/>
+          </a:bodyPr>
+          <a:lstStyle/>
+          <a:p>
+            <a:r>
+              <a:rPr lang="en-GR" dirty="0"/>
+              <a:t>Efficiency-- with tag SF's</a:t>
+            </a:r>
+          </a:p>
+          <a:p>
+            <a:r>
+              <a:rPr lang="en-GR" dirty="0">
+                <a:solidFill>
+                  <a:schemeClr val="tx1">
+                    <a:lumMod val="95000"/>
+                    <a:lumOff val="5000"/>
+                  </a:schemeClr>
+                </a:solidFill>
+              </a:rPr>
+              <a:t>eff data: 0.816 ± 0.032</a:t>
+            </a:r>
+          </a:p>
+          <a:p>
+            <a:r>
+              <a:rPr lang="en-GR" b="1" u="sng" dirty="0">
+                <a:solidFill>
+                  <a:srgbClr val="00B050"/>
+                </a:solidFill>
+              </a:rPr>
+              <a:t>eff ttbar: 0.839 ± 0.005</a:t>
+            </a:r>
+          </a:p>
+          <a:p>
+            <a:r>
+              <a:rPr lang="en-GR" dirty="0"/>
+              <a:t>-----------</a:t>
+            </a:r>
+          </a:p>
+          <a:p>
+            <a:r>
+              <a:rPr lang="en-GR" dirty="0"/>
+              <a:t>Efficiency per Pt region</a:t>
+            </a:r>
+          </a:p>
+          <a:p>
+            <a:r>
+              <a:rPr lang="en-GR" dirty="0"/>
+              <a:t>eff data pT[400-600]: 0.8176 ± 0.038</a:t>
+            </a:r>
+          </a:p>
+          <a:p>
+            <a:r>
+              <a:rPr lang="en-GR" dirty="0"/>
+              <a:t>eff ttbar pT[400-600]: 0.837 ± 0.006</a:t>
+            </a:r>
+          </a:p>
+          <a:p>
+            <a:r>
+              <a:rPr lang="en-GR" dirty="0"/>
+              <a:t>-----------</a:t>
+            </a:r>
+          </a:p>
+          <a:p>
+            <a:r>
+              <a:rPr lang="en-GR" dirty="0"/>
+              <a:t>eff data pT[600-800]: 0.809 ± 0.063</a:t>
+            </a:r>
+          </a:p>
+          <a:p>
+            <a:r>
+              <a:rPr lang="en-GR" dirty="0"/>
+              <a:t>eff ttbar pT[600-800]: 0.847 ± 0.013</a:t>
+            </a:r>
+          </a:p>
+          <a:p>
+            <a:r>
+              <a:rPr lang="en-GR" dirty="0"/>
+              <a:t>-----------</a:t>
+            </a:r>
+          </a:p>
+          <a:p>
+            <a:r>
+              <a:rPr lang="en-GR" dirty="0"/>
+              <a:t>eff data pT[800-Inf]: 0.772 ± 0.132</a:t>
+            </a:r>
+          </a:p>
+          <a:p>
+            <a:r>
+              <a:rPr lang="en-GR" dirty="0"/>
+              <a:t>eff ttbar pT[800-Inf]: 0.868 ± 0.032</a:t>
+            </a:r>
+          </a:p>
+        </p:txBody>
+      </p:sp>
+      <p:sp>
+        <p:nvSpPr>
+          <p:cNvPr id="4" name="Rectangle 3">
+            <a:extLst>
+              <a:ext uri="{FF2B5EF4-FFF2-40B4-BE49-F238E27FC236}">
+                <a16:creationId xmlns:a16="http://schemas.microsoft.com/office/drawing/2014/main" id="{6A55B372-F163-CB40-91A8-4182F6465250}"/>
+              </a:ext>
+            </a:extLst>
+          </p:cNvPr>
+          <p:cNvSpPr/>
+          <p:nvPr/>
+        </p:nvSpPr>
+        <p:spPr>
+          <a:xfrm>
+            <a:off x="7182145" y="1582339"/>
+            <a:ext cx="3804458" cy="3693319"/>
+          </a:xfrm>
+          <a:prstGeom prst="rect">
+            <a:avLst/>
+          </a:prstGeom>
+        </p:spPr>
+        <p:txBody>
+          <a:bodyPr wrap="square">
+            <a:spAutoFit/>
+          </a:bodyPr>
+          <a:lstStyle/>
+          <a:p>
+            <a:r>
+              <a:rPr lang="en-GR" dirty="0"/>
+              <a:t>Efficiency-- without tag sf's</a:t>
+            </a:r>
+          </a:p>
+          <a:p>
+            <a:r>
+              <a:rPr lang="en-GR" dirty="0">
+                <a:solidFill>
+                  <a:schemeClr val="tx1">
+                    <a:lumMod val="95000"/>
+                    <a:lumOff val="5000"/>
+                  </a:schemeClr>
+                </a:solidFill>
+              </a:rPr>
+              <a:t>eff data: 0.822 ± 0.034</a:t>
+            </a:r>
+          </a:p>
+          <a:p>
+            <a:r>
+              <a:rPr lang="en-GR" dirty="0">
+                <a:solidFill>
+                  <a:srgbClr val="00B050"/>
+                </a:solidFill>
+              </a:rPr>
+              <a:t>eff ttbar: 0.839 ± 0.005</a:t>
+            </a:r>
+          </a:p>
+          <a:p>
+            <a:r>
+              <a:rPr lang="en-GR" dirty="0"/>
+              <a:t>-----------</a:t>
+            </a:r>
+          </a:p>
+          <a:p>
+            <a:r>
+              <a:rPr lang="en-GR" dirty="0"/>
+              <a:t>Efficiency per Pt region</a:t>
+            </a:r>
+          </a:p>
+          <a:p>
+            <a:r>
+              <a:rPr lang="en-GR" dirty="0"/>
+              <a:t>eff data pT[400-600]: 0.824 ± 0.039</a:t>
+            </a:r>
+          </a:p>
+          <a:p>
+            <a:r>
+              <a:rPr lang="en-GR" dirty="0"/>
+              <a:t>eff ttbar pT[400-600]: 0.837 ± 0.006</a:t>
+            </a:r>
+          </a:p>
+          <a:p>
+            <a:r>
+              <a:rPr lang="en-GR" dirty="0"/>
+              <a:t>-----------</a:t>
+            </a:r>
+          </a:p>
+          <a:p>
+            <a:r>
+              <a:rPr lang="en-GR" dirty="0"/>
+              <a:t>eff data pT[600-800]: 0.819 ± 0.066</a:t>
+            </a:r>
+          </a:p>
+          <a:p>
+            <a:r>
+              <a:rPr lang="en-GR" dirty="0"/>
+              <a:t>eff ttbar pT[600-800]: 0.847 ± 0.013</a:t>
+            </a:r>
+          </a:p>
+          <a:p>
+            <a:r>
+              <a:rPr lang="en-GR" dirty="0"/>
+              <a:t>-----------</a:t>
+            </a:r>
+          </a:p>
+          <a:p>
+            <a:r>
+              <a:rPr lang="en-GR" dirty="0"/>
+              <a:t>eff data pT[800-Inf]: 0.789 ± 0.141</a:t>
+            </a:r>
+          </a:p>
+          <a:p>
+            <a:r>
+              <a:rPr lang="en-GR" dirty="0"/>
+              <a:t>eff ttbar pT[800-Inf]: 0.868 ± 0.032</a:t>
+            </a:r>
+          </a:p>
+        </p:txBody>
+      </p:sp>
     </p:spTree>
     <p:extLst>
       <p:ext uri="{BB962C8B-B14F-4D97-AF65-F5344CB8AC3E}">
-        <p14:creationId xmlns:p14="http://schemas.microsoft.com/office/powerpoint/2010/main" val="2071165039"/>
+        <p14:creationId xmlns:p14="http://schemas.microsoft.com/office/powerpoint/2010/main" val="4027163055"/>
       </p:ext>
     </p:extLst>
   </p:cSld>
@@ -15529,53 +15669,6 @@
       </p:sp>
       <p:sp>
         <p:nvSpPr>
-          <p:cNvPr id="7" name="TextBox 6"/>
-          <p:cNvSpPr txBox="1"/>
-          <p:nvPr/>
-        </p:nvSpPr>
-        <p:spPr>
-          <a:xfrm>
-            <a:off x="2805007" y="33090"/>
-            <a:ext cx="6581985" cy="523220"/>
-          </a:xfrm>
-          <a:prstGeom prst="rect">
-            <a:avLst/>
-          </a:prstGeom>
-          <a:noFill/>
-        </p:spPr>
-        <p:txBody>
-          <a:bodyPr wrap="square" rtlCol="0">
-            <a:spAutoFit/>
-          </a:bodyPr>
-          <a:lstStyle/>
-          <a:p>
-            <a:pPr algn="ctr"/>
-            <a:r>
-              <a:rPr lang="en-US" sz="2800" u="sng" dirty="0"/>
-              <a:t>Data Vs MC Stacks for BDT output </a:t>
-            </a:r>
-            <a:r>
-              <a:rPr lang="en-US" sz="2800" u="sng" dirty="0">
-                <a:solidFill>
-                  <a:srgbClr val="00B050"/>
-                </a:solidFill>
-              </a:rPr>
-              <a:t>2018</a:t>
-            </a:r>
-            <a:r>
-              <a:rPr lang="en-US" sz="2800" u="sng" dirty="0"/>
-              <a:t> </a:t>
-            </a:r>
-            <a:endParaRPr lang="en-US" sz="2800" u="sng" dirty="0">
-              <a:solidFill>
-                <a:srgbClr val="00B050"/>
-              </a:solidFill>
-            </a:endParaRPr>
-          </a:p>
-        </p:txBody>
-      </p:sp>
-      <p:sp>
-        <p:nvSpPr>
           <p:cNvPr id="5" name="Slide Number Placeholder 4">
             <a:extLst>
               <a:ext uri="{FF2B5EF4-FFF2-40B4-BE49-F238E27FC236}">
@@ -15625,7 +15718,7 @@
           <a:bodyPr/>
           <a:lstStyle/>
           <a:p>
-            <a:fld id="{3DBB7BD0-9B8D-1F47-8ABF-BE3CF9BD2848}" type="datetime1">
+            <a:fld id="{D52D66B2-0E0A-F441-A1DA-8039F615D612}" type="datetime1">
               <a:rPr lang="en-US" smtClean="0"/>
               <a:t>8/31/20</a:t>
             </a:fld>
@@ -15633,82 +15726,12 @@
           </a:p>
         </p:txBody>
       </p:sp>
-      <p:sp>
-        <p:nvSpPr>
-          <p:cNvPr id="6" name="Rectangle 5">
+      <p:pic>
+        <p:nvPicPr>
+          <p:cNvPr id="8" name="Picture 7">
             <a:extLst>
               <a:ext uri="{FF2B5EF4-FFF2-40B4-BE49-F238E27FC236}">
-                <a16:creationId xmlns:a16="http://schemas.microsoft.com/office/drawing/2014/main" id="{1D3A9800-C923-F943-ACA5-B4B9B9A1D73D}"/>
-              </a:ext>
-            </a:extLst>
-          </p:cNvPr>
-          <p:cNvSpPr/>
-          <p:nvPr/>
-        </p:nvSpPr>
-        <p:spPr>
-          <a:xfrm>
-            <a:off x="7939701" y="638586"/>
-            <a:ext cx="2289346" cy="369332"/>
-          </a:xfrm>
-          <a:prstGeom prst="rect">
-            <a:avLst/>
-          </a:prstGeom>
-        </p:spPr>
-        <p:txBody>
-          <a:bodyPr wrap="none">
-            <a:spAutoFit/>
-          </a:bodyPr>
-          <a:lstStyle/>
-          <a:p>
-            <a:pPr algn="ctr"/>
-            <a:r>
-              <a:rPr lang="en-US" u="sng" dirty="0"/>
-              <a:t>without b tagging SF’s </a:t>
-            </a:r>
-          </a:p>
-        </p:txBody>
-      </p:sp>
-      <p:sp>
-        <p:nvSpPr>
-          <p:cNvPr id="8" name="Rectangle 7">
-            <a:extLst>
-              <a:ext uri="{FF2B5EF4-FFF2-40B4-BE49-F238E27FC236}">
-                <a16:creationId xmlns:a16="http://schemas.microsoft.com/office/drawing/2014/main" id="{FE0D63A0-1633-E841-944F-B91BFC6F0FEB}"/>
-              </a:ext>
-            </a:extLst>
-          </p:cNvPr>
-          <p:cNvSpPr/>
-          <p:nvPr/>
-        </p:nvSpPr>
-        <p:spPr>
-          <a:xfrm>
-            <a:off x="2333415" y="638586"/>
-            <a:ext cx="1499065" cy="369332"/>
-          </a:xfrm>
-          <a:prstGeom prst="rect">
-            <a:avLst/>
-          </a:prstGeom>
-        </p:spPr>
-        <p:txBody>
-          <a:bodyPr wrap="none">
-            <a:spAutoFit/>
-          </a:bodyPr>
-          <a:lstStyle/>
-          <a:p>
-            <a:pPr algn="ctr"/>
-            <a:r>
-              <a:rPr lang="en-US" u="sng" dirty="0"/>
-              <a:t>b tagging SF’s </a:t>
-            </a:r>
-          </a:p>
-        </p:txBody>
-      </p:sp>
-      <p:pic>
-        <p:nvPicPr>
-          <p:cNvPr id="4" name="Picture 3">
-            <a:extLst>
-              <a:ext uri="{FF2B5EF4-FFF2-40B4-BE49-F238E27FC236}">
-                <a16:creationId xmlns:a16="http://schemas.microsoft.com/office/drawing/2014/main" id="{53CB29FE-D3FF-7140-B31A-B3D94133F50C}"/>
+                <a16:creationId xmlns:a16="http://schemas.microsoft.com/office/drawing/2014/main" id="{08124A33-50C0-BB46-BE06-3467BA03726B}"/>
               </a:ext>
             </a:extLst>
           </p:cNvPr>
@@ -15725,18 +15748,303 @@
         </p:blipFill>
         <p:spPr>
           <a:xfrm rot="5400000">
-            <a:off x="955524" y="134670"/>
-            <a:ext cx="4946952" cy="6858000"/>
+            <a:off x="7617875" y="-241793"/>
+            <a:ext cx="3012694" cy="4176522"/>
           </a:xfrm>
           <a:prstGeom prst="rect">
             <a:avLst/>
           </a:prstGeom>
         </p:spPr>
       </p:pic>
+      <p:pic>
+        <p:nvPicPr>
+          <p:cNvPr id="11" name="Picture 10">
+            <a:extLst>
+              <a:ext uri="{FF2B5EF4-FFF2-40B4-BE49-F238E27FC236}">
+                <a16:creationId xmlns:a16="http://schemas.microsoft.com/office/drawing/2014/main" id="{4744943B-E532-864E-8A77-D62B2B7A8DFA}"/>
+              </a:ext>
+            </a:extLst>
+          </p:cNvPr>
+          <p:cNvPicPr>
+            <a:picLocks noChangeAspect="1"/>
+          </p:cNvPicPr>
+          <p:nvPr/>
+        </p:nvPicPr>
+        <p:blipFill>
+          <a:blip r:embed="rId3"/>
+          <a:stretch>
+            <a:fillRect/>
+          </a:stretch>
+        </p:blipFill>
+        <p:spPr>
+          <a:xfrm rot="5400000">
+            <a:off x="7617875" y="2837987"/>
+            <a:ext cx="3012694" cy="4176522"/>
+          </a:xfrm>
+          <a:prstGeom prst="rect">
+            <a:avLst/>
+          </a:prstGeom>
+        </p:spPr>
+      </p:pic>
+      <p:sp>
+        <p:nvSpPr>
+          <p:cNvPr id="7" name="TextBox 6"/>
+          <p:cNvSpPr txBox="1"/>
+          <p:nvPr/>
+        </p:nvSpPr>
+        <p:spPr>
+          <a:xfrm>
+            <a:off x="3752850" y="-76347"/>
+            <a:ext cx="4686300" cy="523220"/>
+          </a:xfrm>
+          <a:prstGeom prst="rect">
+            <a:avLst/>
+          </a:prstGeom>
+          <a:noFill/>
+        </p:spPr>
+        <p:txBody>
+          <a:bodyPr wrap="square" rtlCol="0">
+            <a:spAutoFit/>
+          </a:bodyPr>
+          <a:lstStyle/>
+          <a:p>
+            <a:r>
+              <a:rPr lang="en-GR" sz="2800" u="sng" dirty="0"/>
+              <a:t>TagAndProbe Efficiency </a:t>
+            </a:r>
+            <a:r>
+              <a:rPr lang="en-US" sz="2800" u="sng" dirty="0"/>
+              <a:t>(</a:t>
+            </a:r>
+            <a:r>
+              <a:rPr lang="en-US" sz="2800" u="sng" dirty="0">
+                <a:solidFill>
+                  <a:srgbClr val="00B050"/>
+                </a:solidFill>
+              </a:rPr>
+              <a:t>2018</a:t>
+            </a:r>
+            <a:r>
+              <a:rPr lang="en-US" sz="2800" u="sng" dirty="0"/>
+              <a:t>)</a:t>
+            </a:r>
+          </a:p>
+        </p:txBody>
+      </p:sp>
+      <p:pic>
+        <p:nvPicPr>
+          <p:cNvPr id="4" name="Picture 3">
+            <a:extLst>
+              <a:ext uri="{FF2B5EF4-FFF2-40B4-BE49-F238E27FC236}">
+                <a16:creationId xmlns:a16="http://schemas.microsoft.com/office/drawing/2014/main" id="{5F632B27-92BD-1E45-8665-EF48ACC1307B}"/>
+              </a:ext>
+            </a:extLst>
+          </p:cNvPr>
+          <p:cNvPicPr>
+            <a:picLocks noChangeAspect="1"/>
+          </p:cNvPicPr>
+          <p:nvPr/>
+        </p:nvPicPr>
+        <p:blipFill>
+          <a:blip r:embed="rId4"/>
+          <a:stretch>
+            <a:fillRect/>
+          </a:stretch>
+        </p:blipFill>
+        <p:spPr>
+          <a:xfrm rot="5400000">
+            <a:off x="1204475" y="-241793"/>
+            <a:ext cx="3012694" cy="4176522"/>
+          </a:xfrm>
+          <a:prstGeom prst="rect">
+            <a:avLst/>
+          </a:prstGeom>
+        </p:spPr>
+      </p:pic>
+      <p:pic>
+        <p:nvPicPr>
+          <p:cNvPr id="9" name="Picture 8">
+            <a:extLst>
+              <a:ext uri="{FF2B5EF4-FFF2-40B4-BE49-F238E27FC236}">
+                <a16:creationId xmlns:a16="http://schemas.microsoft.com/office/drawing/2014/main" id="{CC987474-2518-244B-A899-90EA804E300B}"/>
+              </a:ext>
+            </a:extLst>
+          </p:cNvPr>
+          <p:cNvPicPr>
+            <a:picLocks noChangeAspect="1"/>
+          </p:cNvPicPr>
+          <p:nvPr/>
+        </p:nvPicPr>
+        <p:blipFill>
+          <a:blip r:embed="rId5"/>
+          <a:stretch>
+            <a:fillRect/>
+          </a:stretch>
+        </p:blipFill>
+        <p:spPr>
+          <a:xfrm rot="5400000">
+            <a:off x="1204475" y="2822489"/>
+            <a:ext cx="3012694" cy="4176522"/>
+          </a:xfrm>
+          <a:prstGeom prst="rect">
+            <a:avLst/>
+          </a:prstGeom>
+        </p:spPr>
+      </p:pic>
+      <p:sp>
+        <p:nvSpPr>
+          <p:cNvPr id="19" name="TextBox 18">
+            <a:extLst>
+              <a:ext uri="{FF2B5EF4-FFF2-40B4-BE49-F238E27FC236}">
+                <a16:creationId xmlns:a16="http://schemas.microsoft.com/office/drawing/2014/main" id="{87A7433F-F7CC-2844-A37A-B9EF728D6FE8}"/>
+              </a:ext>
+            </a:extLst>
+          </p:cNvPr>
+          <p:cNvSpPr txBox="1"/>
+          <p:nvPr/>
+        </p:nvSpPr>
+        <p:spPr>
+          <a:xfrm>
+            <a:off x="4271791" y="4994770"/>
+            <a:ext cx="3243263" cy="369332"/>
+          </a:xfrm>
+          <a:prstGeom prst="rect">
+            <a:avLst/>
+          </a:prstGeom>
+          <a:noFill/>
+        </p:spPr>
+        <p:txBody>
+          <a:bodyPr wrap="square" rtlCol="0">
+            <a:spAutoFit/>
+          </a:bodyPr>
+          <a:lstStyle/>
+          <a:p>
+            <a:pPr algn="ctr"/>
+            <a:r>
+              <a:rPr lang="en-GR" dirty="0"/>
+              <a:t>Tight TopTagger + Probe</a:t>
+            </a:r>
+          </a:p>
+        </p:txBody>
+      </p:sp>
+      <p:sp>
+        <p:nvSpPr>
+          <p:cNvPr id="18" name="TextBox 17">
+            <a:extLst>
+              <a:ext uri="{FF2B5EF4-FFF2-40B4-BE49-F238E27FC236}">
+                <a16:creationId xmlns:a16="http://schemas.microsoft.com/office/drawing/2014/main" id="{531AB382-FCD2-4B43-82A6-0D98FF6E618F}"/>
+              </a:ext>
+            </a:extLst>
+          </p:cNvPr>
+          <p:cNvSpPr txBox="1"/>
+          <p:nvPr/>
+        </p:nvSpPr>
+        <p:spPr>
+          <a:xfrm>
+            <a:off x="4271790" y="1557986"/>
+            <a:ext cx="3243263" cy="369332"/>
+          </a:xfrm>
+          <a:prstGeom prst="rect">
+            <a:avLst/>
+          </a:prstGeom>
+          <a:noFill/>
+        </p:spPr>
+        <p:txBody>
+          <a:bodyPr wrap="square" rtlCol="0">
+            <a:spAutoFit/>
+          </a:bodyPr>
+          <a:lstStyle/>
+          <a:p>
+            <a:pPr algn="ctr"/>
+            <a:r>
+              <a:rPr lang="en-GR" dirty="0"/>
+              <a:t>Tight TopTagger + SR TopTagger</a:t>
+            </a:r>
+          </a:p>
+        </p:txBody>
+      </p:sp>
+      <p:sp>
+        <p:nvSpPr>
+          <p:cNvPr id="17" name="Rectangle 16">
+            <a:extLst>
+              <a:ext uri="{FF2B5EF4-FFF2-40B4-BE49-F238E27FC236}">
+                <a16:creationId xmlns:a16="http://schemas.microsoft.com/office/drawing/2014/main" id="{7F2195D5-6AF3-B94D-B444-5C47384FD281}"/>
+              </a:ext>
+            </a:extLst>
+          </p:cNvPr>
+          <p:cNvSpPr/>
+          <p:nvPr/>
+        </p:nvSpPr>
+        <p:spPr>
+          <a:xfrm>
+            <a:off x="2049125" y="3186241"/>
+            <a:ext cx="1520674" cy="369332"/>
+          </a:xfrm>
+          <a:prstGeom prst="rect">
+            <a:avLst/>
+          </a:prstGeom>
+        </p:spPr>
+        <p:txBody>
+          <a:bodyPr wrap="none">
+            <a:spAutoFit/>
+          </a:bodyPr>
+          <a:lstStyle/>
+          <a:p>
+            <a:pPr algn="ctr"/>
+            <a:r>
+              <a:rPr lang="en-US" b="1" u="sng" dirty="0">
+                <a:solidFill>
+                  <a:srgbClr val="FF0000"/>
+                </a:solidFill>
+              </a:rPr>
+              <a:t>b tagging SF’s </a:t>
+            </a:r>
+          </a:p>
+        </p:txBody>
+      </p:sp>
+      <p:sp>
+        <p:nvSpPr>
+          <p:cNvPr id="20" name="Rectangle 19">
+            <a:extLst>
+              <a:ext uri="{FF2B5EF4-FFF2-40B4-BE49-F238E27FC236}">
+                <a16:creationId xmlns:a16="http://schemas.microsoft.com/office/drawing/2014/main" id="{43E24579-13E4-6140-97A9-7386D280E896}"/>
+              </a:ext>
+            </a:extLst>
+          </p:cNvPr>
+          <p:cNvSpPr/>
+          <p:nvPr/>
+        </p:nvSpPr>
+        <p:spPr>
+          <a:xfrm>
+            <a:off x="8457894" y="3204932"/>
+            <a:ext cx="1849289" cy="369332"/>
+          </a:xfrm>
+          <a:prstGeom prst="rect">
+            <a:avLst/>
+          </a:prstGeom>
+        </p:spPr>
+        <p:txBody>
+          <a:bodyPr wrap="none">
+            <a:spAutoFit/>
+          </a:bodyPr>
+          <a:lstStyle/>
+          <a:p>
+            <a:pPr algn="ctr"/>
+            <a:r>
+              <a:rPr lang="en-US" b="1" u="sng" dirty="0">
+                <a:solidFill>
+                  <a:srgbClr val="FF0000"/>
+                </a:solidFill>
+              </a:rPr>
+              <a:t>No b tagging SF’s </a:t>
+            </a:r>
+          </a:p>
+        </p:txBody>
+      </p:sp>
     </p:spTree>
     <p:extLst>
       <p:ext uri="{BB962C8B-B14F-4D97-AF65-F5344CB8AC3E}">
-        <p14:creationId xmlns:p14="http://schemas.microsoft.com/office/powerpoint/2010/main" val="1051090531"/>
+        <p14:creationId xmlns:p14="http://schemas.microsoft.com/office/powerpoint/2010/main" val="270366993"/>
       </p:ext>
     </p:extLst>
   </p:cSld>
@@ -16960,8 +17268,8 @@
         </p:nvSpPr>
         <p:spPr>
           <a:xfrm>
-            <a:off x="3276600" y="2640823"/>
-            <a:ext cx="5638800" cy="523220"/>
+            <a:off x="2805007" y="33090"/>
+            <a:ext cx="6581985" cy="523220"/>
           </a:xfrm>
           <a:prstGeom prst="rect">
             <a:avLst/>
@@ -16977,8 +17285,25 @@
             <a:pPr algn="ctr"/>
             <a:r>
               <a:rPr lang="en-US" sz="2800" u="sng" dirty="0"/>
-              <a:t>BACKUP SLIDES</a:t>
-            </a:r>
+              <a:t>Data Vs MC Stacks for BDT output </a:t>
+            </a:r>
+            <a:r>
+              <a:rPr lang="en-US" sz="2800" u="sng" dirty="0">
+                <a:solidFill>
+                  <a:srgbClr val="00B0F0"/>
+                </a:solidFill>
+              </a:rPr>
+              <a:t>2016</a:t>
+            </a:r>
+            <a:r>
+              <a:rPr lang="en-US" sz="2800" u="sng" dirty="0"/>
+              <a:t> </a:t>
+            </a:r>
+            <a:endParaRPr lang="en-US" sz="2800" u="sng" dirty="0">
+              <a:solidFill>
+                <a:srgbClr val="00B050"/>
+              </a:solidFill>
+            </a:endParaRPr>
           </a:p>
         </p:txBody>
       </p:sp>
@@ -17041,10 +17366,140 @@
           </a:p>
         </p:txBody>
       </p:sp>
+      <p:sp>
+        <p:nvSpPr>
+          <p:cNvPr id="6" name="Rectangle 5">
+            <a:extLst>
+              <a:ext uri="{FF2B5EF4-FFF2-40B4-BE49-F238E27FC236}">
+                <a16:creationId xmlns:a16="http://schemas.microsoft.com/office/drawing/2014/main" id="{1D3A9800-C923-F943-ACA5-B4B9B9A1D73D}"/>
+              </a:ext>
+            </a:extLst>
+          </p:cNvPr>
+          <p:cNvSpPr/>
+          <p:nvPr/>
+        </p:nvSpPr>
+        <p:spPr>
+          <a:xfrm>
+            <a:off x="7939701" y="638586"/>
+            <a:ext cx="2289346" cy="369332"/>
+          </a:xfrm>
+          <a:prstGeom prst="rect">
+            <a:avLst/>
+          </a:prstGeom>
+        </p:spPr>
+        <p:txBody>
+          <a:bodyPr wrap="none">
+            <a:spAutoFit/>
+          </a:bodyPr>
+          <a:lstStyle/>
+          <a:p>
+            <a:pPr algn="ctr"/>
+            <a:r>
+              <a:rPr lang="en-US" u="sng" dirty="0"/>
+              <a:t>without b tagging SF’s </a:t>
+            </a:r>
+          </a:p>
+        </p:txBody>
+      </p:sp>
+      <p:sp>
+        <p:nvSpPr>
+          <p:cNvPr id="8" name="Rectangle 7">
+            <a:extLst>
+              <a:ext uri="{FF2B5EF4-FFF2-40B4-BE49-F238E27FC236}">
+                <a16:creationId xmlns:a16="http://schemas.microsoft.com/office/drawing/2014/main" id="{FE0D63A0-1633-E841-944F-B91BFC6F0FEB}"/>
+              </a:ext>
+            </a:extLst>
+          </p:cNvPr>
+          <p:cNvSpPr/>
+          <p:nvPr/>
+        </p:nvSpPr>
+        <p:spPr>
+          <a:xfrm>
+            <a:off x="2333415" y="638586"/>
+            <a:ext cx="1499065" cy="369332"/>
+          </a:xfrm>
+          <a:prstGeom prst="rect">
+            <a:avLst/>
+          </a:prstGeom>
+        </p:spPr>
+        <p:txBody>
+          <a:bodyPr wrap="none">
+            <a:spAutoFit/>
+          </a:bodyPr>
+          <a:lstStyle/>
+          <a:p>
+            <a:pPr algn="ctr"/>
+            <a:r>
+              <a:rPr lang="en-US" u="sng" dirty="0"/>
+              <a:t>b tagging SF’s </a:t>
+            </a:r>
+          </a:p>
+        </p:txBody>
+      </p:sp>
+      <p:pic>
+        <p:nvPicPr>
+          <p:cNvPr id="4" name="Picture 3">
+            <a:extLst>
+              <a:ext uri="{FF2B5EF4-FFF2-40B4-BE49-F238E27FC236}">
+                <a16:creationId xmlns:a16="http://schemas.microsoft.com/office/drawing/2014/main" id="{0479B1E7-F202-554C-ADE3-707F5402EA48}"/>
+              </a:ext>
+            </a:extLst>
+          </p:cNvPr>
+          <p:cNvPicPr>
+            <a:picLocks noChangeAspect="1"/>
+          </p:cNvPicPr>
+          <p:nvPr/>
+        </p:nvPicPr>
+        <p:blipFill>
+          <a:blip r:embed="rId2"/>
+          <a:stretch>
+            <a:fillRect/>
+          </a:stretch>
+        </p:blipFill>
+        <p:spPr>
+          <a:xfrm rot="5400000">
+            <a:off x="832739" y="440626"/>
+            <a:ext cx="4311269" cy="5976747"/>
+          </a:xfrm>
+          <a:prstGeom prst="rect">
+            <a:avLst/>
+          </a:prstGeom>
+        </p:spPr>
+      </p:pic>
+      <p:pic>
+        <p:nvPicPr>
+          <p:cNvPr id="10" name="Picture 9">
+            <a:extLst>
+              <a:ext uri="{FF2B5EF4-FFF2-40B4-BE49-F238E27FC236}">
+                <a16:creationId xmlns:a16="http://schemas.microsoft.com/office/drawing/2014/main" id="{B59D90DA-3524-084C-9B71-560A98282EE8}"/>
+              </a:ext>
+            </a:extLst>
+          </p:cNvPr>
+          <p:cNvPicPr>
+            <a:picLocks noChangeAspect="1"/>
+          </p:cNvPicPr>
+          <p:nvPr/>
+        </p:nvPicPr>
+        <p:blipFill>
+          <a:blip r:embed="rId3"/>
+          <a:stretch>
+            <a:fillRect/>
+          </a:stretch>
+        </p:blipFill>
+        <p:spPr>
+          <a:xfrm rot="5400000">
+            <a:off x="6928739" y="440626"/>
+            <a:ext cx="4311269" cy="5976747"/>
+          </a:xfrm>
+          <a:prstGeom prst="rect">
+            <a:avLst/>
+          </a:prstGeom>
+        </p:spPr>
+      </p:pic>
     </p:spTree>
     <p:extLst>
       <p:ext uri="{BB962C8B-B14F-4D97-AF65-F5344CB8AC3E}">
-        <p14:creationId xmlns:p14="http://schemas.microsoft.com/office/powerpoint/2010/main" val="1998869109"/>
+        <p14:creationId xmlns:p14="http://schemas.microsoft.com/office/powerpoint/2010/main" val="83094305"/>
       </p:ext>
     </p:extLst>
   </p:cSld>
@@ -17106,8 +17561,8 @@
         </p:nvSpPr>
         <p:spPr>
           <a:xfrm>
-            <a:off x="504044" y="33090"/>
-            <a:ext cx="10940340" cy="523220"/>
+            <a:off x="2805007" y="33090"/>
+            <a:ext cx="6581985" cy="523220"/>
           </a:xfrm>
           <a:prstGeom prst="rect">
             <a:avLst/>
@@ -17123,16 +17578,25 @@
             <a:pPr algn="ctr"/>
             <a:r>
               <a:rPr lang="en-US" sz="2800" u="sng" dirty="0"/>
-              <a:t>Response Matrices </a:t>
+              <a:t>Data Vs MC Stacks for BDT output </a:t>
             </a:r>
             <a:r>
               <a:rPr lang="en-US" sz="2800" u="sng" dirty="0">
                 <a:solidFill>
-                  <a:srgbClr val="00B0F0"/>
+                  <a:srgbClr val="FF0000"/>
                 </a:solidFill>
               </a:rPr>
-              <a:t>2016</a:t>
-            </a:r>
+              <a:t>2017</a:t>
+            </a:r>
+            <a:r>
+              <a:rPr lang="en-US" sz="2800" u="sng" dirty="0"/>
+              <a:t> </a:t>
+            </a:r>
+            <a:endParaRPr lang="en-US" sz="2800" u="sng" dirty="0">
+              <a:solidFill>
+                <a:srgbClr val="00B050"/>
+              </a:solidFill>
+            </a:endParaRPr>
           </a:p>
         </p:txBody>
       </p:sp>
@@ -17187,7 +17651,7 @@
           <a:bodyPr/>
           <a:lstStyle/>
           <a:p>
-            <a:fld id="{01554C39-4607-164F-AA23-65A72270ACF7}" type="datetime1">
+            <a:fld id="{3DBB7BD0-9B8D-1F47-8ABF-BE3CF9BD2848}" type="datetime1">
               <a:rPr lang="en-US" smtClean="0"/>
               <a:t>8/31/20</a:t>
             </a:fld>
@@ -17197,10 +17661,10 @@
       </p:sp>
       <p:sp>
         <p:nvSpPr>
-          <p:cNvPr id="8" name="Rectangle 7">
+          <p:cNvPr id="6" name="Rectangle 5">
             <a:extLst>
               <a:ext uri="{FF2B5EF4-FFF2-40B4-BE49-F238E27FC236}">
-                <a16:creationId xmlns:a16="http://schemas.microsoft.com/office/drawing/2014/main" id="{137E0740-341B-B64B-AE26-A2C5357809F1}"/>
+                <a16:creationId xmlns:a16="http://schemas.microsoft.com/office/drawing/2014/main" id="{1D3A9800-C923-F943-ACA5-B4B9B9A1D73D}"/>
               </a:ext>
             </a:extLst>
           </p:cNvPr>
@@ -17232,10 +17696,10 @@
       </p:sp>
       <p:sp>
         <p:nvSpPr>
-          <p:cNvPr id="15" name="Rectangle 14">
+          <p:cNvPr id="8" name="Rectangle 7">
             <a:extLst>
               <a:ext uri="{FF2B5EF4-FFF2-40B4-BE49-F238E27FC236}">
-                <a16:creationId xmlns:a16="http://schemas.microsoft.com/office/drawing/2014/main" id="{F855E7F2-8E22-A345-8A7F-56F49B61AE54}"/>
+                <a16:creationId xmlns:a16="http://schemas.microsoft.com/office/drawing/2014/main" id="{FE0D63A0-1633-E841-944F-B91BFC6F0FEB}"/>
               </a:ext>
             </a:extLst>
           </p:cNvPr>
@@ -17267,10 +17731,10 @@
       </p:sp>
       <p:pic>
         <p:nvPicPr>
-          <p:cNvPr id="6" name="Picture 5">
+          <p:cNvPr id="4" name="Picture 3">
             <a:extLst>
               <a:ext uri="{FF2B5EF4-FFF2-40B4-BE49-F238E27FC236}">
-                <a16:creationId xmlns:a16="http://schemas.microsoft.com/office/drawing/2014/main" id="{B916B196-3F50-1042-AB31-52400AFC2C68}"/>
+                <a16:creationId xmlns:a16="http://schemas.microsoft.com/office/drawing/2014/main" id="{A37CDE29-0165-8540-AFD9-47BF96CD3E63}"/>
               </a:ext>
             </a:extLst>
           </p:cNvPr>
@@ -17287,7 +17751,7 @@
         </p:blipFill>
         <p:spPr>
           <a:xfrm rot="5400000">
-            <a:off x="951992" y="691187"/>
+            <a:off x="927312" y="440626"/>
             <a:ext cx="4311269" cy="5976747"/>
           </a:xfrm>
           <a:prstGeom prst="rect">
@@ -17300,7 +17764,7 @@
           <p:cNvPr id="11" name="Picture 10">
             <a:extLst>
               <a:ext uri="{FF2B5EF4-FFF2-40B4-BE49-F238E27FC236}">
-                <a16:creationId xmlns:a16="http://schemas.microsoft.com/office/drawing/2014/main" id="{6FB3C2F5-1028-5449-B5C2-93EE2A79669C}"/>
+                <a16:creationId xmlns:a16="http://schemas.microsoft.com/office/drawing/2014/main" id="{F1BD224C-3E78-0A47-9667-7B654BD6FB2A}"/>
               </a:ext>
             </a:extLst>
           </p:cNvPr>
@@ -17317,7 +17781,7 @@
         </p:blipFill>
         <p:spPr>
           <a:xfrm rot="5400000">
-            <a:off x="7047992" y="691187"/>
+            <a:off x="6904059" y="440626"/>
             <a:ext cx="4311269" cy="5976747"/>
           </a:xfrm>
           <a:prstGeom prst="rect">
@@ -17328,7 +17792,7 @@
     </p:spTree>
     <p:extLst>
       <p:ext uri="{BB962C8B-B14F-4D97-AF65-F5344CB8AC3E}">
-        <p14:creationId xmlns:p14="http://schemas.microsoft.com/office/powerpoint/2010/main" val="1218244233"/>
+        <p14:creationId xmlns:p14="http://schemas.microsoft.com/office/powerpoint/2010/main" val="2071165039"/>
       </p:ext>
     </p:extLst>
   </p:cSld>
@@ -17390,8 +17854,8 @@
         </p:nvSpPr>
         <p:spPr>
           <a:xfrm>
-            <a:off x="504044" y="33090"/>
-            <a:ext cx="10940340" cy="523220"/>
+            <a:off x="2805007" y="33090"/>
+            <a:ext cx="6581985" cy="523220"/>
           </a:xfrm>
           <a:prstGeom prst="rect">
             <a:avLst/>
@@ -17407,16 +17871,25 @@
             <a:pPr algn="ctr"/>
             <a:r>
               <a:rPr lang="en-US" sz="2800" u="sng" dirty="0"/>
-              <a:t>Response Matrices </a:t>
+              <a:t>Data Vs MC Stacks for BDT output </a:t>
             </a:r>
             <a:r>
               <a:rPr lang="en-US" sz="2800" u="sng" dirty="0">
                 <a:solidFill>
-                  <a:srgbClr val="FF0000"/>
+                  <a:srgbClr val="00B050"/>
                 </a:solidFill>
               </a:rPr>
-              <a:t>2017</a:t>
-            </a:r>
+              <a:t>2018</a:t>
+            </a:r>
+            <a:r>
+              <a:rPr lang="en-US" sz="2800" u="sng" dirty="0"/>
+              <a:t> </a:t>
+            </a:r>
+            <a:endParaRPr lang="en-US" sz="2800" u="sng" dirty="0">
+              <a:solidFill>
+                <a:srgbClr val="00B050"/>
+              </a:solidFill>
+            </a:endParaRPr>
           </a:p>
         </p:txBody>
       </p:sp>
@@ -17471,7 +17944,7 @@
           <a:bodyPr/>
           <a:lstStyle/>
           <a:p>
-            <a:fld id="{01554C39-4607-164F-AA23-65A72270ACF7}" type="datetime1">
+            <a:fld id="{3DBB7BD0-9B8D-1F47-8ABF-BE3CF9BD2848}" type="datetime1">
               <a:rPr lang="en-US" smtClean="0"/>
               <a:t>8/31/20</a:t>
             </a:fld>
@@ -17481,10 +17954,10 @@
       </p:sp>
       <p:sp>
         <p:nvSpPr>
-          <p:cNvPr id="8" name="Rectangle 7">
+          <p:cNvPr id="6" name="Rectangle 5">
             <a:extLst>
               <a:ext uri="{FF2B5EF4-FFF2-40B4-BE49-F238E27FC236}">
-                <a16:creationId xmlns:a16="http://schemas.microsoft.com/office/drawing/2014/main" id="{137E0740-341B-B64B-AE26-A2C5357809F1}"/>
+                <a16:creationId xmlns:a16="http://schemas.microsoft.com/office/drawing/2014/main" id="{1D3A9800-C923-F943-ACA5-B4B9B9A1D73D}"/>
               </a:ext>
             </a:extLst>
           </p:cNvPr>
@@ -17516,10 +17989,10 @@
       </p:sp>
       <p:sp>
         <p:nvSpPr>
-          <p:cNvPr id="15" name="Rectangle 14">
+          <p:cNvPr id="8" name="Rectangle 7">
             <a:extLst>
               <a:ext uri="{FF2B5EF4-FFF2-40B4-BE49-F238E27FC236}">
-                <a16:creationId xmlns:a16="http://schemas.microsoft.com/office/drawing/2014/main" id="{F855E7F2-8E22-A345-8A7F-56F49B61AE54}"/>
+                <a16:creationId xmlns:a16="http://schemas.microsoft.com/office/drawing/2014/main" id="{FE0D63A0-1633-E841-944F-B91BFC6F0FEB}"/>
               </a:ext>
             </a:extLst>
           </p:cNvPr>
@@ -17551,10 +18024,10 @@
       </p:sp>
       <p:pic>
         <p:nvPicPr>
-          <p:cNvPr id="4" name="Picture 3">
+          <p:cNvPr id="9" name="Picture 8">
             <a:extLst>
               <a:ext uri="{FF2B5EF4-FFF2-40B4-BE49-F238E27FC236}">
-                <a16:creationId xmlns:a16="http://schemas.microsoft.com/office/drawing/2014/main" id="{22F19D61-6B3F-2C4C-B756-CB9ED5548A92}"/>
+                <a16:creationId xmlns:a16="http://schemas.microsoft.com/office/drawing/2014/main" id="{2E336555-93F3-FD4F-B090-6BE11BE0DBFF}"/>
               </a:ext>
             </a:extLst>
           </p:cNvPr>
@@ -17571,7 +18044,7 @@
         </p:blipFill>
         <p:spPr>
           <a:xfrm rot="5400000">
-            <a:off x="832739" y="702986"/>
+            <a:off x="951991" y="439725"/>
             <a:ext cx="4311269" cy="5976747"/>
           </a:xfrm>
           <a:prstGeom prst="rect">
@@ -17581,10 +18054,10 @@
       </p:pic>
       <p:pic>
         <p:nvPicPr>
-          <p:cNvPr id="9" name="Picture 8">
+          <p:cNvPr id="11" name="Picture 10">
             <a:extLst>
               <a:ext uri="{FF2B5EF4-FFF2-40B4-BE49-F238E27FC236}">
-                <a16:creationId xmlns:a16="http://schemas.microsoft.com/office/drawing/2014/main" id="{88C1BB65-3065-F74E-B7A9-01E27DF2352D}"/>
+                <a16:creationId xmlns:a16="http://schemas.microsoft.com/office/drawing/2014/main" id="{10CBFBAD-304D-7948-AD39-DEB83BD977DD}"/>
               </a:ext>
             </a:extLst>
           </p:cNvPr>
@@ -17601,7 +18074,7 @@
         </p:blipFill>
         <p:spPr>
           <a:xfrm rot="5400000">
-            <a:off x="6953421" y="702986"/>
+            <a:off x="6928738" y="439724"/>
             <a:ext cx="4311269" cy="5976747"/>
           </a:xfrm>
           <a:prstGeom prst="rect">
@@ -17612,7 +18085,7 @@
     </p:spTree>
     <p:extLst>
       <p:ext uri="{BB962C8B-B14F-4D97-AF65-F5344CB8AC3E}">
-        <p14:creationId xmlns:p14="http://schemas.microsoft.com/office/powerpoint/2010/main" val="585653806"/>
+        <p14:creationId xmlns:p14="http://schemas.microsoft.com/office/powerpoint/2010/main" val="1051090531"/>
       </p:ext>
     </p:extLst>
   </p:cSld>
@@ -17674,8 +18147,8 @@
         </p:nvSpPr>
         <p:spPr>
           <a:xfrm>
-            <a:off x="504044" y="33090"/>
-            <a:ext cx="10940340" cy="523220"/>
+            <a:off x="3276600" y="2640823"/>
+            <a:ext cx="5638800" cy="523220"/>
           </a:xfrm>
           <a:prstGeom prst="rect">
             <a:avLst/>
@@ -17691,15 +18164,7 @@
             <a:pPr algn="ctr"/>
             <a:r>
               <a:rPr lang="en-US" sz="2800" u="sng" dirty="0"/>
-              <a:t>Response Matrices </a:t>
-            </a:r>
-            <a:r>
-              <a:rPr lang="en-US" sz="2800" u="sng" dirty="0">
-                <a:solidFill>
-                  <a:srgbClr val="00B050"/>
-                </a:solidFill>
-              </a:rPr>
-              <a:t>2018</a:t>
+              <a:t>BACKUP SLIDES</a:t>
             </a:r>
           </a:p>
         </p:txBody>
@@ -17729,6 +18194,728 @@
               <a:rPr lang="en-US" smtClean="0"/>
               <a:pPr/>
               <a:t>33</a:t>
+            </a:fld>
+            <a:endParaRPr lang="en-US" dirty="0"/>
+          </a:p>
+        </p:txBody>
+      </p:sp>
+      <p:sp>
+        <p:nvSpPr>
+          <p:cNvPr id="24" name="Date Placeholder 23">
+            <a:extLst>
+              <a:ext uri="{FF2B5EF4-FFF2-40B4-BE49-F238E27FC236}">
+                <a16:creationId xmlns:a16="http://schemas.microsoft.com/office/drawing/2014/main" id="{056D71EF-2E89-4043-8F92-90A4D46A3E69}"/>
+              </a:ext>
+            </a:extLst>
+          </p:cNvPr>
+          <p:cNvSpPr>
+            <a:spLocks noGrp="1"/>
+          </p:cNvSpPr>
+          <p:nvPr>
+            <p:ph type="dt" sz="half" idx="10"/>
+          </p:nvPr>
+        </p:nvSpPr>
+        <p:spPr/>
+        <p:txBody>
+          <a:bodyPr/>
+          <a:lstStyle/>
+          <a:p>
+            <a:fld id="{3DBB7BD0-9B8D-1F47-8ABF-BE3CF9BD2848}" type="datetime1">
+              <a:rPr lang="en-US" smtClean="0"/>
+              <a:t>8/31/20</a:t>
+            </a:fld>
+            <a:endParaRPr lang="en-US" dirty="0"/>
+          </a:p>
+        </p:txBody>
+      </p:sp>
+    </p:spTree>
+    <p:extLst>
+      <p:ext uri="{BB962C8B-B14F-4D97-AF65-F5344CB8AC3E}">
+        <p14:creationId xmlns:p14="http://schemas.microsoft.com/office/powerpoint/2010/main" val="1998869109"/>
+      </p:ext>
+    </p:extLst>
+  </p:cSld>
+  <p:clrMapOvr>
+    <a:masterClrMapping/>
+  </p:clrMapOvr>
+</p:sld>
+</file>
+
+<file path=ppt/slides/slide34.xml><?xml version="1.0" encoding="utf-8"?>
+<p:sld xmlns:a="http://schemas.openxmlformats.org/drawingml/2006/main" xmlns:r="http://schemas.openxmlformats.org/officeDocument/2006/relationships" xmlns:p="http://schemas.openxmlformats.org/presentationml/2006/main">
+  <p:cSld>
+    <p:spTree>
+      <p:nvGrpSpPr>
+        <p:cNvPr id="1" name=""/>
+        <p:cNvGrpSpPr/>
+        <p:nvPr/>
+      </p:nvGrpSpPr>
+      <p:grpSpPr>
+        <a:xfrm>
+          <a:off x="0" y="0"/>
+          <a:ext cx="0" cy="0"/>
+          <a:chOff x="0" y="0"/>
+          <a:chExt cx="0" cy="0"/>
+        </a:xfrm>
+      </p:grpSpPr>
+      <p:sp>
+        <p:nvSpPr>
+          <p:cNvPr id="3" name="Footer Placeholder 2"/>
+          <p:cNvSpPr>
+            <a:spLocks noGrp="1"/>
+          </p:cNvSpPr>
+          <p:nvPr>
+            <p:ph type="ftr" sz="quarter" idx="11"/>
+          </p:nvPr>
+        </p:nvSpPr>
+        <p:spPr/>
+        <p:txBody>
+          <a:bodyPr/>
+          <a:lstStyle/>
+          <a:p>
+            <a:r>
+              <a:rPr lang="fi-FI" dirty="0"/>
+              <a:t>NTUA G. </a:t>
+            </a:r>
+            <a:r>
+              <a:rPr lang="fi-FI" dirty="0" err="1"/>
+              <a:t>Bakas</a:t>
+            </a:r>
+            <a:endParaRPr lang="en-US" dirty="0"/>
+          </a:p>
+        </p:txBody>
+      </p:sp>
+      <p:sp>
+        <p:nvSpPr>
+          <p:cNvPr id="7" name="TextBox 6"/>
+          <p:cNvSpPr txBox="1"/>
+          <p:nvPr/>
+        </p:nvSpPr>
+        <p:spPr>
+          <a:xfrm>
+            <a:off x="504044" y="33090"/>
+            <a:ext cx="10940340" cy="523220"/>
+          </a:xfrm>
+          <a:prstGeom prst="rect">
+            <a:avLst/>
+          </a:prstGeom>
+          <a:noFill/>
+        </p:spPr>
+        <p:txBody>
+          <a:bodyPr wrap="square" rtlCol="0">
+            <a:spAutoFit/>
+          </a:bodyPr>
+          <a:lstStyle/>
+          <a:p>
+            <a:pPr algn="ctr"/>
+            <a:r>
+              <a:rPr lang="en-US" sz="2800" u="sng" dirty="0"/>
+              <a:t>Response Matrices </a:t>
+            </a:r>
+            <a:r>
+              <a:rPr lang="en-US" sz="2800" u="sng" dirty="0">
+                <a:solidFill>
+                  <a:srgbClr val="00B0F0"/>
+                </a:solidFill>
+              </a:rPr>
+              <a:t>2016</a:t>
+            </a:r>
+          </a:p>
+        </p:txBody>
+      </p:sp>
+      <p:sp>
+        <p:nvSpPr>
+          <p:cNvPr id="5" name="Slide Number Placeholder 4">
+            <a:extLst>
+              <a:ext uri="{FF2B5EF4-FFF2-40B4-BE49-F238E27FC236}">
+                <a16:creationId xmlns:a16="http://schemas.microsoft.com/office/drawing/2014/main" id="{69A96869-DB60-5345-ACD9-F1C41035B064}"/>
+              </a:ext>
+            </a:extLst>
+          </p:cNvPr>
+          <p:cNvSpPr>
+            <a:spLocks noGrp="1"/>
+          </p:cNvSpPr>
+          <p:nvPr>
+            <p:ph type="sldNum" sz="quarter" idx="12"/>
+          </p:nvPr>
+        </p:nvSpPr>
+        <p:spPr/>
+        <p:txBody>
+          <a:bodyPr/>
+          <a:lstStyle/>
+          <a:p>
+            <a:fld id="{4FAB73BC-B049-4115-A692-8D63A059BFB8}" type="slidenum">
+              <a:rPr lang="en-US" smtClean="0"/>
+              <a:pPr/>
+              <a:t>34</a:t>
+            </a:fld>
+            <a:endParaRPr lang="en-US" dirty="0"/>
+          </a:p>
+        </p:txBody>
+      </p:sp>
+      <p:sp>
+        <p:nvSpPr>
+          <p:cNvPr id="24" name="Date Placeholder 23">
+            <a:extLst>
+              <a:ext uri="{FF2B5EF4-FFF2-40B4-BE49-F238E27FC236}">
+                <a16:creationId xmlns:a16="http://schemas.microsoft.com/office/drawing/2014/main" id="{056D71EF-2E89-4043-8F92-90A4D46A3E69}"/>
+              </a:ext>
+            </a:extLst>
+          </p:cNvPr>
+          <p:cNvSpPr>
+            <a:spLocks noGrp="1"/>
+          </p:cNvSpPr>
+          <p:nvPr>
+            <p:ph type="dt" sz="half" idx="10"/>
+          </p:nvPr>
+        </p:nvSpPr>
+        <p:spPr/>
+        <p:txBody>
+          <a:bodyPr/>
+          <a:lstStyle/>
+          <a:p>
+            <a:fld id="{01554C39-4607-164F-AA23-65A72270ACF7}" type="datetime1">
+              <a:rPr lang="en-US" smtClean="0"/>
+              <a:t>8/31/20</a:t>
+            </a:fld>
+            <a:endParaRPr lang="en-US" dirty="0"/>
+          </a:p>
+        </p:txBody>
+      </p:sp>
+      <p:sp>
+        <p:nvSpPr>
+          <p:cNvPr id="8" name="Rectangle 7">
+            <a:extLst>
+              <a:ext uri="{FF2B5EF4-FFF2-40B4-BE49-F238E27FC236}">
+                <a16:creationId xmlns:a16="http://schemas.microsoft.com/office/drawing/2014/main" id="{137E0740-341B-B64B-AE26-A2C5357809F1}"/>
+              </a:ext>
+            </a:extLst>
+          </p:cNvPr>
+          <p:cNvSpPr/>
+          <p:nvPr/>
+        </p:nvSpPr>
+        <p:spPr>
+          <a:xfrm>
+            <a:off x="7939701" y="638586"/>
+            <a:ext cx="2289346" cy="369332"/>
+          </a:xfrm>
+          <a:prstGeom prst="rect">
+            <a:avLst/>
+          </a:prstGeom>
+        </p:spPr>
+        <p:txBody>
+          <a:bodyPr wrap="none">
+            <a:spAutoFit/>
+          </a:bodyPr>
+          <a:lstStyle/>
+          <a:p>
+            <a:pPr algn="ctr"/>
+            <a:r>
+              <a:rPr lang="en-US" u="sng" dirty="0"/>
+              <a:t>without b tagging SF’s </a:t>
+            </a:r>
+          </a:p>
+        </p:txBody>
+      </p:sp>
+      <p:sp>
+        <p:nvSpPr>
+          <p:cNvPr id="15" name="Rectangle 14">
+            <a:extLst>
+              <a:ext uri="{FF2B5EF4-FFF2-40B4-BE49-F238E27FC236}">
+                <a16:creationId xmlns:a16="http://schemas.microsoft.com/office/drawing/2014/main" id="{F855E7F2-8E22-A345-8A7F-56F49B61AE54}"/>
+              </a:ext>
+            </a:extLst>
+          </p:cNvPr>
+          <p:cNvSpPr/>
+          <p:nvPr/>
+        </p:nvSpPr>
+        <p:spPr>
+          <a:xfrm>
+            <a:off x="2333415" y="638586"/>
+            <a:ext cx="1499065" cy="369332"/>
+          </a:xfrm>
+          <a:prstGeom prst="rect">
+            <a:avLst/>
+          </a:prstGeom>
+        </p:spPr>
+        <p:txBody>
+          <a:bodyPr wrap="none">
+            <a:spAutoFit/>
+          </a:bodyPr>
+          <a:lstStyle/>
+          <a:p>
+            <a:pPr algn="ctr"/>
+            <a:r>
+              <a:rPr lang="en-US" u="sng" dirty="0"/>
+              <a:t>b tagging SF’s </a:t>
+            </a:r>
+          </a:p>
+        </p:txBody>
+      </p:sp>
+      <p:pic>
+        <p:nvPicPr>
+          <p:cNvPr id="6" name="Picture 5">
+            <a:extLst>
+              <a:ext uri="{FF2B5EF4-FFF2-40B4-BE49-F238E27FC236}">
+                <a16:creationId xmlns:a16="http://schemas.microsoft.com/office/drawing/2014/main" id="{B916B196-3F50-1042-AB31-52400AFC2C68}"/>
+              </a:ext>
+            </a:extLst>
+          </p:cNvPr>
+          <p:cNvPicPr>
+            <a:picLocks noChangeAspect="1"/>
+          </p:cNvPicPr>
+          <p:nvPr/>
+        </p:nvPicPr>
+        <p:blipFill>
+          <a:blip r:embed="rId2"/>
+          <a:stretch>
+            <a:fillRect/>
+          </a:stretch>
+        </p:blipFill>
+        <p:spPr>
+          <a:xfrm rot="5400000">
+            <a:off x="951992" y="691187"/>
+            <a:ext cx="4311269" cy="5976747"/>
+          </a:xfrm>
+          <a:prstGeom prst="rect">
+            <a:avLst/>
+          </a:prstGeom>
+        </p:spPr>
+      </p:pic>
+      <p:pic>
+        <p:nvPicPr>
+          <p:cNvPr id="11" name="Picture 10">
+            <a:extLst>
+              <a:ext uri="{FF2B5EF4-FFF2-40B4-BE49-F238E27FC236}">
+                <a16:creationId xmlns:a16="http://schemas.microsoft.com/office/drawing/2014/main" id="{6FB3C2F5-1028-5449-B5C2-93EE2A79669C}"/>
+              </a:ext>
+            </a:extLst>
+          </p:cNvPr>
+          <p:cNvPicPr>
+            <a:picLocks noChangeAspect="1"/>
+          </p:cNvPicPr>
+          <p:nvPr/>
+        </p:nvPicPr>
+        <p:blipFill>
+          <a:blip r:embed="rId3"/>
+          <a:stretch>
+            <a:fillRect/>
+          </a:stretch>
+        </p:blipFill>
+        <p:spPr>
+          <a:xfrm rot="5400000">
+            <a:off x="7047992" y="691187"/>
+            <a:ext cx="4311269" cy="5976747"/>
+          </a:xfrm>
+          <a:prstGeom prst="rect">
+            <a:avLst/>
+          </a:prstGeom>
+        </p:spPr>
+      </p:pic>
+    </p:spTree>
+    <p:extLst>
+      <p:ext uri="{BB962C8B-B14F-4D97-AF65-F5344CB8AC3E}">
+        <p14:creationId xmlns:p14="http://schemas.microsoft.com/office/powerpoint/2010/main" val="1218244233"/>
+      </p:ext>
+    </p:extLst>
+  </p:cSld>
+  <p:clrMapOvr>
+    <a:masterClrMapping/>
+  </p:clrMapOvr>
+</p:sld>
+</file>
+
+<file path=ppt/slides/slide35.xml><?xml version="1.0" encoding="utf-8"?>
+<p:sld xmlns:a="http://schemas.openxmlformats.org/drawingml/2006/main" xmlns:r="http://schemas.openxmlformats.org/officeDocument/2006/relationships" xmlns:p="http://schemas.openxmlformats.org/presentationml/2006/main">
+  <p:cSld>
+    <p:spTree>
+      <p:nvGrpSpPr>
+        <p:cNvPr id="1" name=""/>
+        <p:cNvGrpSpPr/>
+        <p:nvPr/>
+      </p:nvGrpSpPr>
+      <p:grpSpPr>
+        <a:xfrm>
+          <a:off x="0" y="0"/>
+          <a:ext cx="0" cy="0"/>
+          <a:chOff x="0" y="0"/>
+          <a:chExt cx="0" cy="0"/>
+        </a:xfrm>
+      </p:grpSpPr>
+      <p:sp>
+        <p:nvSpPr>
+          <p:cNvPr id="3" name="Footer Placeholder 2"/>
+          <p:cNvSpPr>
+            <a:spLocks noGrp="1"/>
+          </p:cNvSpPr>
+          <p:nvPr>
+            <p:ph type="ftr" sz="quarter" idx="11"/>
+          </p:nvPr>
+        </p:nvSpPr>
+        <p:spPr/>
+        <p:txBody>
+          <a:bodyPr/>
+          <a:lstStyle/>
+          <a:p>
+            <a:r>
+              <a:rPr lang="fi-FI" dirty="0"/>
+              <a:t>NTUA G. </a:t>
+            </a:r>
+            <a:r>
+              <a:rPr lang="fi-FI" dirty="0" err="1"/>
+              <a:t>Bakas</a:t>
+            </a:r>
+            <a:endParaRPr lang="en-US" dirty="0"/>
+          </a:p>
+        </p:txBody>
+      </p:sp>
+      <p:sp>
+        <p:nvSpPr>
+          <p:cNvPr id="7" name="TextBox 6"/>
+          <p:cNvSpPr txBox="1"/>
+          <p:nvPr/>
+        </p:nvSpPr>
+        <p:spPr>
+          <a:xfrm>
+            <a:off x="504044" y="33090"/>
+            <a:ext cx="10940340" cy="523220"/>
+          </a:xfrm>
+          <a:prstGeom prst="rect">
+            <a:avLst/>
+          </a:prstGeom>
+          <a:noFill/>
+        </p:spPr>
+        <p:txBody>
+          <a:bodyPr wrap="square" rtlCol="0">
+            <a:spAutoFit/>
+          </a:bodyPr>
+          <a:lstStyle/>
+          <a:p>
+            <a:pPr algn="ctr"/>
+            <a:r>
+              <a:rPr lang="en-US" sz="2800" u="sng" dirty="0"/>
+              <a:t>Response Matrices </a:t>
+            </a:r>
+            <a:r>
+              <a:rPr lang="en-US" sz="2800" u="sng" dirty="0">
+                <a:solidFill>
+                  <a:srgbClr val="FF0000"/>
+                </a:solidFill>
+              </a:rPr>
+              <a:t>2017</a:t>
+            </a:r>
+          </a:p>
+        </p:txBody>
+      </p:sp>
+      <p:sp>
+        <p:nvSpPr>
+          <p:cNvPr id="5" name="Slide Number Placeholder 4">
+            <a:extLst>
+              <a:ext uri="{FF2B5EF4-FFF2-40B4-BE49-F238E27FC236}">
+                <a16:creationId xmlns:a16="http://schemas.microsoft.com/office/drawing/2014/main" id="{69A96869-DB60-5345-ACD9-F1C41035B064}"/>
+              </a:ext>
+            </a:extLst>
+          </p:cNvPr>
+          <p:cNvSpPr>
+            <a:spLocks noGrp="1"/>
+          </p:cNvSpPr>
+          <p:nvPr>
+            <p:ph type="sldNum" sz="quarter" idx="12"/>
+          </p:nvPr>
+        </p:nvSpPr>
+        <p:spPr/>
+        <p:txBody>
+          <a:bodyPr/>
+          <a:lstStyle/>
+          <a:p>
+            <a:fld id="{4FAB73BC-B049-4115-A692-8D63A059BFB8}" type="slidenum">
+              <a:rPr lang="en-US" smtClean="0"/>
+              <a:pPr/>
+              <a:t>35</a:t>
+            </a:fld>
+            <a:endParaRPr lang="en-US" dirty="0"/>
+          </a:p>
+        </p:txBody>
+      </p:sp>
+      <p:sp>
+        <p:nvSpPr>
+          <p:cNvPr id="24" name="Date Placeholder 23">
+            <a:extLst>
+              <a:ext uri="{FF2B5EF4-FFF2-40B4-BE49-F238E27FC236}">
+                <a16:creationId xmlns:a16="http://schemas.microsoft.com/office/drawing/2014/main" id="{056D71EF-2E89-4043-8F92-90A4D46A3E69}"/>
+              </a:ext>
+            </a:extLst>
+          </p:cNvPr>
+          <p:cNvSpPr>
+            <a:spLocks noGrp="1"/>
+          </p:cNvSpPr>
+          <p:nvPr>
+            <p:ph type="dt" sz="half" idx="10"/>
+          </p:nvPr>
+        </p:nvSpPr>
+        <p:spPr/>
+        <p:txBody>
+          <a:bodyPr/>
+          <a:lstStyle/>
+          <a:p>
+            <a:fld id="{01554C39-4607-164F-AA23-65A72270ACF7}" type="datetime1">
+              <a:rPr lang="en-US" smtClean="0"/>
+              <a:t>8/31/20</a:t>
+            </a:fld>
+            <a:endParaRPr lang="en-US" dirty="0"/>
+          </a:p>
+        </p:txBody>
+      </p:sp>
+      <p:sp>
+        <p:nvSpPr>
+          <p:cNvPr id="8" name="Rectangle 7">
+            <a:extLst>
+              <a:ext uri="{FF2B5EF4-FFF2-40B4-BE49-F238E27FC236}">
+                <a16:creationId xmlns:a16="http://schemas.microsoft.com/office/drawing/2014/main" id="{137E0740-341B-B64B-AE26-A2C5357809F1}"/>
+              </a:ext>
+            </a:extLst>
+          </p:cNvPr>
+          <p:cNvSpPr/>
+          <p:nvPr/>
+        </p:nvSpPr>
+        <p:spPr>
+          <a:xfrm>
+            <a:off x="7939701" y="638586"/>
+            <a:ext cx="2289346" cy="369332"/>
+          </a:xfrm>
+          <a:prstGeom prst="rect">
+            <a:avLst/>
+          </a:prstGeom>
+        </p:spPr>
+        <p:txBody>
+          <a:bodyPr wrap="none">
+            <a:spAutoFit/>
+          </a:bodyPr>
+          <a:lstStyle/>
+          <a:p>
+            <a:pPr algn="ctr"/>
+            <a:r>
+              <a:rPr lang="en-US" u="sng" dirty="0"/>
+              <a:t>without b tagging SF’s </a:t>
+            </a:r>
+          </a:p>
+        </p:txBody>
+      </p:sp>
+      <p:sp>
+        <p:nvSpPr>
+          <p:cNvPr id="15" name="Rectangle 14">
+            <a:extLst>
+              <a:ext uri="{FF2B5EF4-FFF2-40B4-BE49-F238E27FC236}">
+                <a16:creationId xmlns:a16="http://schemas.microsoft.com/office/drawing/2014/main" id="{F855E7F2-8E22-A345-8A7F-56F49B61AE54}"/>
+              </a:ext>
+            </a:extLst>
+          </p:cNvPr>
+          <p:cNvSpPr/>
+          <p:nvPr/>
+        </p:nvSpPr>
+        <p:spPr>
+          <a:xfrm>
+            <a:off x="2333415" y="638586"/>
+            <a:ext cx="1499065" cy="369332"/>
+          </a:xfrm>
+          <a:prstGeom prst="rect">
+            <a:avLst/>
+          </a:prstGeom>
+        </p:spPr>
+        <p:txBody>
+          <a:bodyPr wrap="none">
+            <a:spAutoFit/>
+          </a:bodyPr>
+          <a:lstStyle/>
+          <a:p>
+            <a:pPr algn="ctr"/>
+            <a:r>
+              <a:rPr lang="en-US" u="sng" dirty="0"/>
+              <a:t>b tagging SF’s </a:t>
+            </a:r>
+          </a:p>
+        </p:txBody>
+      </p:sp>
+      <p:pic>
+        <p:nvPicPr>
+          <p:cNvPr id="4" name="Picture 3">
+            <a:extLst>
+              <a:ext uri="{FF2B5EF4-FFF2-40B4-BE49-F238E27FC236}">
+                <a16:creationId xmlns:a16="http://schemas.microsoft.com/office/drawing/2014/main" id="{22F19D61-6B3F-2C4C-B756-CB9ED5548A92}"/>
+              </a:ext>
+            </a:extLst>
+          </p:cNvPr>
+          <p:cNvPicPr>
+            <a:picLocks noChangeAspect="1"/>
+          </p:cNvPicPr>
+          <p:nvPr/>
+        </p:nvPicPr>
+        <p:blipFill>
+          <a:blip r:embed="rId2"/>
+          <a:stretch>
+            <a:fillRect/>
+          </a:stretch>
+        </p:blipFill>
+        <p:spPr>
+          <a:xfrm rot="5400000">
+            <a:off x="832739" y="702986"/>
+            <a:ext cx="4311269" cy="5976747"/>
+          </a:xfrm>
+          <a:prstGeom prst="rect">
+            <a:avLst/>
+          </a:prstGeom>
+        </p:spPr>
+      </p:pic>
+      <p:pic>
+        <p:nvPicPr>
+          <p:cNvPr id="9" name="Picture 8">
+            <a:extLst>
+              <a:ext uri="{FF2B5EF4-FFF2-40B4-BE49-F238E27FC236}">
+                <a16:creationId xmlns:a16="http://schemas.microsoft.com/office/drawing/2014/main" id="{88C1BB65-3065-F74E-B7A9-01E27DF2352D}"/>
+              </a:ext>
+            </a:extLst>
+          </p:cNvPr>
+          <p:cNvPicPr>
+            <a:picLocks noChangeAspect="1"/>
+          </p:cNvPicPr>
+          <p:nvPr/>
+        </p:nvPicPr>
+        <p:blipFill>
+          <a:blip r:embed="rId3"/>
+          <a:stretch>
+            <a:fillRect/>
+          </a:stretch>
+        </p:blipFill>
+        <p:spPr>
+          <a:xfrm rot="5400000">
+            <a:off x="6953421" y="702986"/>
+            <a:ext cx="4311269" cy="5976747"/>
+          </a:xfrm>
+          <a:prstGeom prst="rect">
+            <a:avLst/>
+          </a:prstGeom>
+        </p:spPr>
+      </p:pic>
+    </p:spTree>
+    <p:extLst>
+      <p:ext uri="{BB962C8B-B14F-4D97-AF65-F5344CB8AC3E}">
+        <p14:creationId xmlns:p14="http://schemas.microsoft.com/office/powerpoint/2010/main" val="585653806"/>
+      </p:ext>
+    </p:extLst>
+  </p:cSld>
+  <p:clrMapOvr>
+    <a:masterClrMapping/>
+  </p:clrMapOvr>
+</p:sld>
+</file>
+
+<file path=ppt/slides/slide36.xml><?xml version="1.0" encoding="utf-8"?>
+<p:sld xmlns:a="http://schemas.openxmlformats.org/drawingml/2006/main" xmlns:r="http://schemas.openxmlformats.org/officeDocument/2006/relationships" xmlns:p="http://schemas.openxmlformats.org/presentationml/2006/main">
+  <p:cSld>
+    <p:spTree>
+      <p:nvGrpSpPr>
+        <p:cNvPr id="1" name=""/>
+        <p:cNvGrpSpPr/>
+        <p:nvPr/>
+      </p:nvGrpSpPr>
+      <p:grpSpPr>
+        <a:xfrm>
+          <a:off x="0" y="0"/>
+          <a:ext cx="0" cy="0"/>
+          <a:chOff x="0" y="0"/>
+          <a:chExt cx="0" cy="0"/>
+        </a:xfrm>
+      </p:grpSpPr>
+      <p:sp>
+        <p:nvSpPr>
+          <p:cNvPr id="3" name="Footer Placeholder 2"/>
+          <p:cNvSpPr>
+            <a:spLocks noGrp="1"/>
+          </p:cNvSpPr>
+          <p:nvPr>
+            <p:ph type="ftr" sz="quarter" idx="11"/>
+          </p:nvPr>
+        </p:nvSpPr>
+        <p:spPr/>
+        <p:txBody>
+          <a:bodyPr/>
+          <a:lstStyle/>
+          <a:p>
+            <a:r>
+              <a:rPr lang="fi-FI" dirty="0"/>
+              <a:t>NTUA G. </a:t>
+            </a:r>
+            <a:r>
+              <a:rPr lang="fi-FI" dirty="0" err="1"/>
+              <a:t>Bakas</a:t>
+            </a:r>
+            <a:endParaRPr lang="en-US" dirty="0"/>
+          </a:p>
+        </p:txBody>
+      </p:sp>
+      <p:sp>
+        <p:nvSpPr>
+          <p:cNvPr id="7" name="TextBox 6"/>
+          <p:cNvSpPr txBox="1"/>
+          <p:nvPr/>
+        </p:nvSpPr>
+        <p:spPr>
+          <a:xfrm>
+            <a:off x="504044" y="33090"/>
+            <a:ext cx="10940340" cy="523220"/>
+          </a:xfrm>
+          <a:prstGeom prst="rect">
+            <a:avLst/>
+          </a:prstGeom>
+          <a:noFill/>
+        </p:spPr>
+        <p:txBody>
+          <a:bodyPr wrap="square" rtlCol="0">
+            <a:spAutoFit/>
+          </a:bodyPr>
+          <a:lstStyle/>
+          <a:p>
+            <a:pPr algn="ctr"/>
+            <a:r>
+              <a:rPr lang="en-US" sz="2800" u="sng" dirty="0"/>
+              <a:t>Response Matrices </a:t>
+            </a:r>
+            <a:r>
+              <a:rPr lang="en-US" sz="2800" u="sng" dirty="0">
+                <a:solidFill>
+                  <a:srgbClr val="00B050"/>
+                </a:solidFill>
+              </a:rPr>
+              <a:t>2018</a:t>
+            </a:r>
+          </a:p>
+        </p:txBody>
+      </p:sp>
+      <p:sp>
+        <p:nvSpPr>
+          <p:cNvPr id="5" name="Slide Number Placeholder 4">
+            <a:extLst>
+              <a:ext uri="{FF2B5EF4-FFF2-40B4-BE49-F238E27FC236}">
+                <a16:creationId xmlns:a16="http://schemas.microsoft.com/office/drawing/2014/main" id="{69A96869-DB60-5345-ACD9-F1C41035B064}"/>
+              </a:ext>
+            </a:extLst>
+          </p:cNvPr>
+          <p:cNvSpPr>
+            <a:spLocks noGrp="1"/>
+          </p:cNvSpPr>
+          <p:nvPr>
+            <p:ph type="sldNum" sz="quarter" idx="12"/>
+          </p:nvPr>
+        </p:nvSpPr>
+        <p:spPr/>
+        <p:txBody>
+          <a:bodyPr/>
+          <a:lstStyle/>
+          <a:p>
+            <a:fld id="{4FAB73BC-B049-4115-A692-8D63A059BFB8}" type="slidenum">
+              <a:rPr lang="en-US" smtClean="0"/>
+              <a:pPr/>
+              <a:t>36</a:t>
             </a:fld>
             <a:endParaRPr lang="en-US" dirty="0"/>
           </a:p>

</xml_diff>

<commit_message>
Added several stuff, as well as a change in the SingalExtraction_UnequalBins so that you can have nomralised and not diff xsec results
</commit_message>
<xml_diff>
--- a/Documents for Progress/AnalysisStatus_31August2020.pptx
+++ b/Documents for Progress/AnalysisStatus_31August2020.pptx
@@ -242,7 +242,7 @@
           <a:p>
             <a:fld id="{EC97F6CE-C9BA-5B44-AF0F-C73B1C17650F}" type="datetime1">
               <a:rPr lang="en-US" smtClean="0"/>
-              <a:t>9/2/20</a:t>
+              <a:t>9/7/20</a:t>
             </a:fld>
             <a:endParaRPr lang="en-GB"/>
           </a:p>
@@ -448,7 +448,7 @@
           <a:p>
             <a:fld id="{7F9D4A26-E586-E648-884B-C9B1EA03133F}" type="datetime1">
               <a:rPr lang="en-US" smtClean="0"/>
-              <a:t>9/2/20</a:t>
+              <a:t>9/7/20</a:t>
             </a:fld>
             <a:endParaRPr lang="en-GB"/>
           </a:p>
@@ -782,7 +782,7 @@
           <a:p>
             <a:fld id="{33D9703A-F6B0-E34C-B7F9-5A8864FF4F07}" type="datetime1">
               <a:rPr lang="en-US" smtClean="0"/>
-              <a:t>9/2/20</a:t>
+              <a:t>9/7/20</a:t>
             </a:fld>
             <a:endParaRPr lang="en-GB"/>
           </a:p>
@@ -889,7 +889,114 @@
           <a:p>
             <a:fld id="{7F9D4A26-E586-E648-884B-C9B1EA03133F}" type="datetime1">
               <a:rPr lang="en-US" smtClean="0"/>
-              <a:t>9/2/20</a:t>
+              <a:t>9/7/20</a:t>
+            </a:fld>
+            <a:endParaRPr lang="en-GB"/>
+          </a:p>
+        </p:txBody>
+      </p:sp>
+      <p:sp>
+        <p:nvSpPr>
+          <p:cNvPr id="5" name="Slide Number Placeholder 4"/>
+          <p:cNvSpPr>
+            <a:spLocks noGrp="1"/>
+          </p:cNvSpPr>
+          <p:nvPr>
+            <p:ph type="sldNum" sz="quarter" idx="5"/>
+          </p:nvPr>
+        </p:nvSpPr>
+        <p:spPr/>
+        <p:txBody>
+          <a:bodyPr/>
+          <a:lstStyle/>
+          <a:p>
+            <a:fld id="{5033F1CD-332F-48CC-8A24-9D0A5CE7D91D}" type="slidenum">
+              <a:rPr lang="en-GB" smtClean="0"/>
+              <a:t>21</a:t>
+            </a:fld>
+            <a:endParaRPr lang="en-GB"/>
+          </a:p>
+        </p:txBody>
+      </p:sp>
+    </p:spTree>
+    <p:extLst>
+      <p:ext uri="{BB962C8B-B14F-4D97-AF65-F5344CB8AC3E}">
+        <p14:creationId xmlns:p14="http://schemas.microsoft.com/office/powerpoint/2010/main" val="131540719"/>
+      </p:ext>
+    </p:extLst>
+  </p:cSld>
+  <p:clrMapOvr>
+    <a:masterClrMapping/>
+  </p:clrMapOvr>
+</p:notes>
+</file>
+
+<file path=ppt/notesSlides/notesSlide3.xml><?xml version="1.0" encoding="utf-8"?>
+<p:notes xmlns:a="http://schemas.openxmlformats.org/drawingml/2006/main" xmlns:r="http://schemas.openxmlformats.org/officeDocument/2006/relationships" xmlns:p="http://schemas.openxmlformats.org/presentationml/2006/main">
+  <p:cSld>
+    <p:spTree>
+      <p:nvGrpSpPr>
+        <p:cNvPr id="1" name=""/>
+        <p:cNvGrpSpPr/>
+        <p:nvPr/>
+      </p:nvGrpSpPr>
+      <p:grpSpPr>
+        <a:xfrm>
+          <a:off x="0" y="0"/>
+          <a:ext cx="0" cy="0"/>
+          <a:chOff x="0" y="0"/>
+          <a:chExt cx="0" cy="0"/>
+        </a:xfrm>
+      </p:grpSpPr>
+      <p:sp>
+        <p:nvSpPr>
+          <p:cNvPr id="2" name="Slide Image Placeholder 1"/>
+          <p:cNvSpPr>
+            <a:spLocks noGrp="1" noRot="1" noChangeAspect="1"/>
+          </p:cNvSpPr>
+          <p:nvPr>
+            <p:ph type="sldImg"/>
+          </p:nvPr>
+        </p:nvSpPr>
+        <p:spPr/>
+      </p:sp>
+      <p:sp>
+        <p:nvSpPr>
+          <p:cNvPr id="3" name="Notes Placeholder 2"/>
+          <p:cNvSpPr>
+            <a:spLocks noGrp="1"/>
+          </p:cNvSpPr>
+          <p:nvPr>
+            <p:ph type="body" idx="1"/>
+          </p:nvPr>
+        </p:nvSpPr>
+        <p:spPr/>
+        <p:txBody>
+          <a:bodyPr/>
+          <a:lstStyle/>
+          <a:p>
+            <a:endParaRPr lang="en-GR" dirty="0"/>
+          </a:p>
+        </p:txBody>
+      </p:sp>
+      <p:sp>
+        <p:nvSpPr>
+          <p:cNvPr id="4" name="Date Placeholder 3"/>
+          <p:cNvSpPr>
+            <a:spLocks noGrp="1"/>
+          </p:cNvSpPr>
+          <p:nvPr>
+            <p:ph type="dt" idx="1"/>
+          </p:nvPr>
+        </p:nvSpPr>
+        <p:spPr/>
+        <p:txBody>
+          <a:bodyPr/>
+          <a:lstStyle/>
+          <a:p>
+            <a:fld id="{7F9D4A26-E586-E648-884B-C9B1EA03133F}" type="datetime1">
+              <a:rPr lang="en-US" smtClean="0"/>
+              <a:t>9/7/20</a:t>
             </a:fld>
             <a:endParaRPr lang="en-GB"/>
           </a:p>
@@ -1157,7 +1264,7 @@
           <a:p>
             <a:fld id="{DC51A3BE-CA11-4547-A39A-766971096B34}" type="datetime1">
               <a:rPr lang="en-US" smtClean="0"/>
-              <a:t>9/2/20</a:t>
+              <a:t>9/7/20</a:t>
             </a:fld>
             <a:endParaRPr lang="en-US" dirty="0"/>
           </a:p>
@@ -1364,7 +1471,7 @@
           <a:p>
             <a:fld id="{42B2CF9A-A7BF-1245-99D9-4054301C36E0}" type="datetime1">
               <a:rPr lang="en-US" smtClean="0"/>
-              <a:t>9/2/20</a:t>
+              <a:t>9/7/20</a:t>
             </a:fld>
             <a:endParaRPr lang="en-US" dirty="0"/>
           </a:p>
@@ -1619,7 +1726,7 @@
           <a:p>
             <a:fld id="{F88F3968-5050-1740-9AB7-A06844E87E5F}" type="datetime1">
               <a:rPr lang="en-US" smtClean="0"/>
-              <a:t>9/2/20</a:t>
+              <a:t>9/7/20</a:t>
             </a:fld>
             <a:endParaRPr lang="en-US" dirty="0"/>
           </a:p>
@@ -1810,7 +1917,7 @@
           <a:p>
             <a:fld id="{6A19A844-E33A-B644-A0FB-7455E93D924C}" type="datetime1">
               <a:rPr lang="en-US" smtClean="0"/>
-              <a:t>9/2/20</a:t>
+              <a:t>9/7/20</a:t>
             </a:fld>
             <a:endParaRPr lang="en-GB"/>
           </a:p>
@@ -1984,7 +2091,7 @@
           <a:p>
             <a:fld id="{F61E92BF-DA59-B546-88AE-9835521A3798}" type="datetime1">
               <a:rPr lang="en-US" smtClean="0"/>
-              <a:t>9/2/20</a:t>
+              <a:t>9/7/20</a:t>
             </a:fld>
             <a:endParaRPr lang="en-GB"/>
           </a:p>
@@ -2234,7 +2341,7 @@
           <a:p>
             <a:fld id="{61C78CAC-926A-EF4D-9608-460C3A301243}" type="datetime1">
               <a:rPr lang="en-US" smtClean="0"/>
-              <a:t>9/2/20</a:t>
+              <a:t>9/7/20</a:t>
             </a:fld>
             <a:endParaRPr lang="en-GB"/>
           </a:p>
@@ -2470,7 +2577,7 @@
           <a:p>
             <a:fld id="{32675A6D-6B9B-6546-A3DC-004E809EED54}" type="datetime1">
               <a:rPr lang="en-US" smtClean="0"/>
-              <a:t>9/2/20</a:t>
+              <a:t>9/7/20</a:t>
             </a:fld>
             <a:endParaRPr lang="en-GB"/>
           </a:p>
@@ -2841,7 +2948,7 @@
           <a:p>
             <a:fld id="{55D89806-B328-B147-9EC9-15D0307996ED}" type="datetime1">
               <a:rPr lang="en-US" smtClean="0"/>
-              <a:t>9/2/20</a:t>
+              <a:t>9/7/20</a:t>
             </a:fld>
             <a:endParaRPr lang="en-GB"/>
           </a:p>
@@ -2963,7 +3070,7 @@
           <a:p>
             <a:fld id="{702FE0D6-14B8-A94B-B441-7BA984189CE2}" type="datetime1">
               <a:rPr lang="en-US" smtClean="0"/>
-              <a:t>9/2/20</a:t>
+              <a:t>9/7/20</a:t>
             </a:fld>
             <a:endParaRPr lang="en-GB"/>
           </a:p>
@@ -3062,7 +3169,7 @@
           <a:p>
             <a:fld id="{4C294EA8-7AEB-3247-9A81-8483D03B0462}" type="datetime1">
               <a:rPr lang="en-US" smtClean="0"/>
-              <a:t>9/2/20</a:t>
+              <a:t>9/7/20</a:t>
             </a:fld>
             <a:endParaRPr lang="en-GB"/>
           </a:p>
@@ -3343,7 +3450,7 @@
           <a:p>
             <a:fld id="{D72E9315-386E-6846-8498-4330F1BBFC0A}" type="datetime1">
               <a:rPr lang="en-US" smtClean="0"/>
-              <a:t>9/2/20</a:t>
+              <a:t>9/7/20</a:t>
             </a:fld>
             <a:endParaRPr lang="en-GB"/>
           </a:p>
@@ -3499,7 +3606,7 @@
           <a:p>
             <a:fld id="{0E394EB9-E681-C34A-89D4-D81E4C62EA5B}" type="datetime1">
               <a:rPr lang="en-US" smtClean="0"/>
-              <a:t>9/2/20</a:t>
+              <a:t>9/7/20</a:t>
             </a:fld>
             <a:endParaRPr lang="en-US" dirty="0"/>
           </a:p>
@@ -3780,7 +3887,7 @@
           <a:p>
             <a:fld id="{E220BF5D-E794-2B42-91EC-2A3B4450069D}" type="datetime1">
               <a:rPr lang="en-US" smtClean="0"/>
-              <a:t>9/2/20</a:t>
+              <a:t>9/7/20</a:t>
             </a:fld>
             <a:endParaRPr lang="en-GB"/>
           </a:p>
@@ -3954,7 +4061,7 @@
           <a:p>
             <a:fld id="{BA4C039E-7082-7D42-AA91-9FF3EF6ADB5B}" type="datetime1">
               <a:rPr lang="en-US" smtClean="0"/>
-              <a:t>9/2/20</a:t>
+              <a:t>9/7/20</a:t>
             </a:fld>
             <a:endParaRPr lang="en-GB"/>
           </a:p>
@@ -4138,7 +4245,7 @@
           <a:p>
             <a:fld id="{2817B3FE-3894-A848-8D78-14007FB2FF94}" type="datetime1">
               <a:rPr lang="en-US" smtClean="0"/>
-              <a:t>9/2/20</a:t>
+              <a:t>9/7/20</a:t>
             </a:fld>
             <a:endParaRPr lang="en-GB"/>
           </a:p>
@@ -4485,7 +4592,7 @@
           <a:p>
             <a:fld id="{2DEEC64B-3E48-2F44-A6A9-A1C06A2C021E}" type="datetime1">
               <a:rPr lang="en-US" smtClean="0"/>
-              <a:t>9/2/20</a:t>
+              <a:t>9/7/20</a:t>
             </a:fld>
             <a:endParaRPr lang="en-US" dirty="0"/>
           </a:p>
@@ -4759,7 +4866,7 @@
           <a:p>
             <a:fld id="{61E195D8-183A-7F4D-8D17-8ADC90214B8A}" type="datetime1">
               <a:rPr lang="en-US" smtClean="0"/>
-              <a:t>9/2/20</a:t>
+              <a:t>9/7/20</a:t>
             </a:fld>
             <a:endParaRPr lang="en-US" dirty="0"/>
           </a:p>
@@ -5137,7 +5244,7 @@
           <a:p>
             <a:fld id="{0DD0A991-48AE-1D43-8113-23F8EAF6681B}" type="datetime1">
               <a:rPr lang="en-US" smtClean="0"/>
-              <a:t>9/2/20</a:t>
+              <a:t>9/7/20</a:t>
             </a:fld>
             <a:endParaRPr lang="en-US" dirty="0"/>
           </a:p>
@@ -5254,7 +5361,7 @@
           <a:p>
             <a:fld id="{DC12579A-EC7F-EB4A-BC5C-80733D051D29}" type="datetime1">
               <a:rPr lang="en-US" smtClean="0"/>
-              <a:t>9/2/20</a:t>
+              <a:t>9/7/20</a:t>
             </a:fld>
             <a:endParaRPr lang="en-US" dirty="0"/>
           </a:p>
@@ -5424,7 +5531,7 @@
           <a:p>
             <a:fld id="{669454CD-6DAB-7942-9B1D-8F3E2B882464}" type="datetime1">
               <a:rPr lang="en-US" smtClean="0"/>
-              <a:t>9/2/20</a:t>
+              <a:t>9/7/20</a:t>
             </a:fld>
             <a:endParaRPr lang="en-US" dirty="0"/>
           </a:p>
@@ -5808,7 +5915,7 @@
           <a:p>
             <a:fld id="{BD2CAD36-D42B-D445-A707-AA59905C7768}" type="datetime1">
               <a:rPr lang="en-US" smtClean="0"/>
-              <a:t>9/2/20</a:t>
+              <a:t>9/7/20</a:t>
             </a:fld>
             <a:endParaRPr lang="en-US" dirty="0"/>
           </a:p>
@@ -6190,7 +6297,7 @@
           <a:p>
             <a:fld id="{2D1D63B8-BB32-E649-92D4-94351543394C}" type="datetime1">
               <a:rPr lang="en-US" smtClean="0"/>
-              <a:t>9/2/20</a:t>
+              <a:t>9/7/20</a:t>
             </a:fld>
             <a:endParaRPr lang="en-US" dirty="0"/>
           </a:p>
@@ -6476,7 +6583,7 @@
           <a:p>
             <a:fld id="{FD02AE22-A9EA-FE42-BAB8-AD1D7606FF2E}" type="datetime1">
               <a:rPr lang="en-US" smtClean="0"/>
-              <a:t>9/2/20</a:t>
+              <a:t>9/7/20</a:t>
             </a:fld>
             <a:endParaRPr lang="en-US" dirty="0"/>
           </a:p>
@@ -7166,7 +7273,7 @@
           <a:p>
             <a:fld id="{307A731C-B4EF-644F-8FDB-2EBA3EC9415A}" type="datetime1">
               <a:rPr lang="en-US" smtClean="0"/>
-              <a:t>9/2/20</a:t>
+              <a:t>9/7/20</a:t>
             </a:fld>
             <a:endParaRPr lang="en-GB"/>
           </a:p>
@@ -7715,22 +7822,6 @@
               <a:rPr lang="en-US" dirty="0" err="1"/>
               <a:t>Bakas</a:t>
             </a:r>
-            <a:r>
-              <a:rPr lang="en-US" dirty="0"/>
-              <a:t>, </a:t>
-            </a:r>
-            <a:r>
-              <a:rPr lang="en-US" dirty="0" err="1"/>
-              <a:t>Ioannis</a:t>
-            </a:r>
-            <a:r>
-              <a:rPr lang="en-US" dirty="0"/>
-              <a:t> </a:t>
-            </a:r>
-            <a:r>
-              <a:rPr lang="en-US" dirty="0" err="1"/>
-              <a:t>Papakrivopoulos</a:t>
-            </a:r>
             <a:endParaRPr lang="en-US" dirty="0"/>
           </a:p>
         </p:txBody>
@@ -7883,7 +7974,7 @@
           <a:p>
             <a:fld id="{01554C39-4607-164F-AA23-65A72270ACF7}" type="datetime1">
               <a:rPr lang="en-US" smtClean="0"/>
-              <a:t>9/2/20</a:t>
+              <a:t>9/7/20</a:t>
             </a:fld>
             <a:endParaRPr lang="en-US" dirty="0"/>
           </a:p>
@@ -8167,7 +8258,7 @@
           <a:p>
             <a:fld id="{01554C39-4607-164F-AA23-65A72270ACF7}" type="datetime1">
               <a:rPr lang="en-US" smtClean="0"/>
-              <a:t>9/2/20</a:t>
+              <a:t>9/7/20</a:t>
             </a:fld>
             <a:endParaRPr lang="en-US" dirty="0"/>
           </a:p>
@@ -8451,7 +8542,7 @@
           <a:p>
             <a:fld id="{01554C39-4607-164F-AA23-65A72270ACF7}" type="datetime1">
               <a:rPr lang="en-US" smtClean="0"/>
-              <a:t>9/2/20</a:t>
+              <a:t>9/7/20</a:t>
             </a:fld>
             <a:endParaRPr lang="en-US" dirty="0"/>
           </a:p>
@@ -8735,7 +8826,7 @@
           <a:p>
             <a:fld id="{01554C39-4607-164F-AA23-65A72270ACF7}" type="datetime1">
               <a:rPr lang="en-US" smtClean="0"/>
-              <a:t>9/2/20</a:t>
+              <a:t>9/7/20</a:t>
             </a:fld>
             <a:endParaRPr lang="en-US" dirty="0"/>
           </a:p>
@@ -9019,7 +9110,7 @@
           <a:p>
             <a:fld id="{01554C39-4607-164F-AA23-65A72270ACF7}" type="datetime1">
               <a:rPr lang="en-US" smtClean="0"/>
-              <a:t>9/2/20</a:t>
+              <a:t>9/7/20</a:t>
             </a:fld>
             <a:endParaRPr lang="en-US" dirty="0"/>
           </a:p>
@@ -9303,7 +9394,7 @@
           <a:p>
             <a:fld id="{01554C39-4607-164F-AA23-65A72270ACF7}" type="datetime1">
               <a:rPr lang="en-US" smtClean="0"/>
-              <a:t>9/2/20</a:t>
+              <a:t>9/7/20</a:t>
             </a:fld>
             <a:endParaRPr lang="en-US" dirty="0"/>
           </a:p>
@@ -9549,7 +9640,7 @@
           <a:p>
             <a:fld id="{01554C39-4607-164F-AA23-65A72270ACF7}" type="datetime1">
               <a:rPr lang="en-US" smtClean="0"/>
-              <a:t>9/2/20</a:t>
+              <a:t>9/7/20</a:t>
             </a:fld>
             <a:endParaRPr lang="en-US" dirty="0"/>
           </a:p>
@@ -9878,7 +9969,7 @@
           <a:p>
             <a:fld id="{01554C39-4607-164F-AA23-65A72270ACF7}" type="datetime1">
               <a:rPr lang="en-US" smtClean="0"/>
-              <a:t>9/2/20</a:t>
+              <a:t>9/7/20</a:t>
             </a:fld>
             <a:endParaRPr lang="en-US" dirty="0"/>
           </a:p>
@@ -10168,7 +10259,7 @@
           <a:p>
             <a:fld id="{01554C39-4607-164F-AA23-65A72270ACF7}" type="datetime1">
               <a:rPr lang="en-US" smtClean="0"/>
-              <a:t>9/2/20</a:t>
+              <a:t>9/7/20</a:t>
             </a:fld>
             <a:endParaRPr lang="en-US" dirty="0"/>
           </a:p>
@@ -10556,7 +10647,7 @@
           <a:p>
             <a:fld id="{D52D66B2-0E0A-F441-A1DA-8039F615D612}" type="datetime1">
               <a:rPr lang="en-US" smtClean="0"/>
-              <a:t>9/2/20</a:t>
+              <a:t>9/7/20</a:t>
             </a:fld>
             <a:endParaRPr lang="en-US" dirty="0"/>
           </a:p>
@@ -11562,7 +11653,7 @@
           <a:p>
             <a:fld id="{37E2C1DD-94AF-5B41-A54A-0C8426B7BC1A}" type="datetime1">
               <a:rPr lang="en-US" smtClean="0"/>
-              <a:t>9/2/20</a:t>
+              <a:t>9/7/20</a:t>
             </a:fld>
             <a:endParaRPr lang="en-US" dirty="0"/>
           </a:p>
@@ -11784,7 +11875,7 @@
           <a:p>
             <a:fld id="{18FD8BA5-77B4-654F-B2FF-4855A5BA42B8}" type="datetime1">
               <a:rPr lang="en-US" smtClean="0"/>
-              <a:t>9/2/20</a:t>
+              <a:t>9/7/20</a:t>
             </a:fld>
             <a:endParaRPr lang="en-US" dirty="0"/>
           </a:p>
@@ -12369,42 +12460,12 @@
           <a:p>
             <a:fld id="{3DBB7BD0-9B8D-1F47-8ABF-BE3CF9BD2848}" type="datetime1">
               <a:rPr lang="en-US" smtClean="0"/>
-              <a:t>9/2/20</a:t>
+              <a:t>9/7/20</a:t>
             </a:fld>
             <a:endParaRPr lang="en-US" dirty="0"/>
           </a:p>
         </p:txBody>
       </p:sp>
-      <p:pic>
-        <p:nvPicPr>
-          <p:cNvPr id="8" name="Picture 7">
-            <a:extLst>
-              <a:ext uri="{FF2B5EF4-FFF2-40B4-BE49-F238E27FC236}">
-                <a16:creationId xmlns:a16="http://schemas.microsoft.com/office/drawing/2014/main" id="{D60D9A3E-CD51-7A4B-85D1-831729E09BCC}"/>
-              </a:ext>
-            </a:extLst>
-          </p:cNvPr>
-          <p:cNvPicPr>
-            <a:picLocks noChangeAspect="1"/>
-          </p:cNvPicPr>
-          <p:nvPr/>
-        </p:nvPicPr>
-        <p:blipFill>
-          <a:blip r:embed="rId2"/>
-          <a:stretch>
-            <a:fillRect/>
-          </a:stretch>
-        </p:blipFill>
-        <p:spPr>
-          <a:xfrm rot="5400000">
-            <a:off x="6031822" y="116586"/>
-            <a:ext cx="5631688" cy="6624828"/>
-          </a:xfrm>
-          <a:prstGeom prst="rect">
-            <a:avLst/>
-          </a:prstGeom>
-        </p:spPr>
-      </p:pic>
       <p:sp>
         <p:nvSpPr>
           <p:cNvPr id="9" name="Rectangle 8">
@@ -12420,7 +12481,7 @@
         <p:spPr>
           <a:xfrm>
             <a:off x="31920" y="889843"/>
-            <a:ext cx="6096000" cy="5078313"/>
+            <a:ext cx="6096000" cy="5447645"/>
           </a:xfrm>
           <a:prstGeom prst="rect">
             <a:avLst/>
@@ -12639,12 +12700,15 @@
             </a:r>
           </a:p>
           <a:p>
-            <a:endParaRPr lang="en-GB" sz="1200" dirty="0">
-              <a:solidFill>
-                <a:srgbClr val="000000"/>
-              </a:solidFill>
-              <a:latin typeface="Menlo" panose="020B0609030804020204" pitchFamily="49" charset="0"/>
-            </a:endParaRPr>
+            <a:r>
+              <a:rPr lang="en-GB" sz="1200" dirty="0">
+                <a:solidFill>
+                  <a:srgbClr val="000000"/>
+                </a:solidFill>
+                <a:latin typeface="Menlo" panose="020B0609030804020204" pitchFamily="49" charset="0"/>
+              </a:rPr>
+              <a:t>   </a:t>
+            </a:r>
           </a:p>
           <a:p>
             <a:r>
@@ -12712,7 +12776,7 @@
                 </a:solidFill>
                 <a:latin typeface="Menlo" panose="020B0609030804020204" pitchFamily="49" charset="0"/>
               </a:rPr>
-              <a:t>    1.0156e+00 +/-  2.79e-02</a:t>
+              <a:t>    1.0153e+00 +/-  2.83e-02</a:t>
             </a:r>
           </a:p>
           <a:p>
@@ -12741,7 +12805,7 @@
                 </a:solidFill>
                 <a:latin typeface="Menlo" panose="020B0609030804020204" pitchFamily="49" charset="0"/>
               </a:rPr>
-              <a:t>    9.8998e-01 +/-  1.92e-03</a:t>
+              <a:t>    9.8997e-01 +/-  1.92e-03</a:t>
             </a:r>
           </a:p>
           <a:p>
@@ -12752,7 +12816,7 @@
                 </a:solidFill>
                 <a:latin typeface="Menlo" panose="020B0609030804020204" pitchFamily="49" charset="0"/>
               </a:rPr>
-              <a:t>               kQCD_2b    1.2365e-02 +/-  2.50e-03</a:t>
+              <a:t>               kQCD_2b    1.2803e-02 +/-  2.82e-03</a:t>
             </a:r>
           </a:p>
           <a:p>
@@ -12763,7 +12827,7 @@
                 </a:solidFill>
                 <a:latin typeface="Menlo" panose="020B0609030804020204" pitchFamily="49" charset="0"/>
               </a:rPr>
-              <a:t>            nFitBkg_2b    1.6612e+00 +/-  6.55e+03</a:t>
+              <a:t>            nFitBkg_2b    1.2661e+02 +/-  3.92e+02</a:t>
             </a:r>
           </a:p>
           <a:p>
@@ -12774,7 +12838,7 @@
                 </a:solidFill>
                 <a:latin typeface="Menlo" panose="020B0609030804020204" pitchFamily="49" charset="0"/>
               </a:rPr>
-              <a:t>            nFitQCD_2b    5.0843e+03 +/-  1.80e+02</a:t>
+              <a:t>            nFitQCD_2b    4.9706e+03 +/-  2.95e+02</a:t>
             </a:r>
           </a:p>
           <a:p>
@@ -12785,7 +12849,7 @@
                 </a:solidFill>
                 <a:latin typeface="Menlo" panose="020B0609030804020204" pitchFamily="49" charset="0"/>
               </a:rPr>
-              <a:t>             nFitSig2b    7.7041e+03 +/-  1.80e+02</a:t>
+              <a:t>             nFitSig2b    7.6928e+03 +/-  1.83e+02</a:t>
             </a:r>
           </a:p>
           <a:p>
@@ -12804,23 +12868,8 @@
                 </a:solidFill>
                 <a:latin typeface="Menlo" panose="020B0609030804020204" pitchFamily="49" charset="0"/>
               </a:rPr>
-              <a:t>Signal strength: r = 0.687217 </a:t>
-            </a:r>
-            <a:r>
-              <a:rPr lang="en-GB" sz="1200" b="1" u="sng">
-                <a:solidFill>
-                  <a:srgbClr val="00B050"/>
-                </a:solidFill>
-                <a:latin typeface="Menlo" panose="020B0609030804020204" pitchFamily="49" charset="0"/>
-              </a:rPr>
-              <a:t>± 0.0194349 (new)</a:t>
-            </a:r>
-            <a:endParaRPr lang="en-GB" sz="1200" b="1" u="sng" dirty="0">
-              <a:solidFill>
-                <a:srgbClr val="00B050"/>
-              </a:solidFill>
-              <a:latin typeface="Menlo" panose="020B0609030804020204" pitchFamily="49" charset="0"/>
-            </a:endParaRPr>
+              <a:t>Signal strength: r = 0.686214 ± 0.019771</a:t>
+            </a:r>
           </a:p>
           <a:p>
             <a:endParaRPr lang="en-GB" sz="1200" dirty="0">
@@ -12830,8 +12879,49 @@
               <a:latin typeface="Menlo" panose="020B0609030804020204" pitchFamily="49" charset="0"/>
             </a:endParaRPr>
           </a:p>
-        </p:txBody>
-      </p:sp>
+          <a:p>
+            <a:endParaRPr lang="en-GB" sz="1200" b="1" u="sng" dirty="0">
+              <a:solidFill>
+                <a:srgbClr val="000000"/>
+              </a:solidFill>
+              <a:latin typeface="Menlo" panose="020B0609030804020204" pitchFamily="49" charset="0"/>
+            </a:endParaRPr>
+          </a:p>
+          <a:p>
+            <a:endParaRPr lang="en-GB" sz="1200" dirty="0"/>
+          </a:p>
+        </p:txBody>
+      </p:sp>
+      <p:pic>
+        <p:nvPicPr>
+          <p:cNvPr id="11" name="Picture 10">
+            <a:extLst>
+              <a:ext uri="{FF2B5EF4-FFF2-40B4-BE49-F238E27FC236}">
+                <a16:creationId xmlns:a16="http://schemas.microsoft.com/office/drawing/2014/main" id="{EFCC128D-5E7E-C242-BEA9-235ED780CB6D}"/>
+              </a:ext>
+            </a:extLst>
+          </p:cNvPr>
+          <p:cNvPicPr>
+            <a:picLocks noChangeAspect="1"/>
+          </p:cNvPicPr>
+          <p:nvPr/>
+        </p:nvPicPr>
+        <p:blipFill>
+          <a:blip r:embed="rId3"/>
+          <a:stretch>
+            <a:fillRect/>
+          </a:stretch>
+        </p:blipFill>
+        <p:spPr>
+          <a:xfrm rot="5400000">
+            <a:off x="5836020" y="59740"/>
+            <a:ext cx="5631688" cy="6624828"/>
+          </a:xfrm>
+          <a:prstGeom prst="rect">
+            <a:avLst/>
+          </a:prstGeom>
+        </p:spPr>
+      </p:pic>
     </p:spTree>
     <p:extLst>
       <p:ext uri="{BB962C8B-B14F-4D97-AF65-F5344CB8AC3E}">
@@ -12977,7 +13067,7 @@
           <a:p>
             <a:fld id="{3DBB7BD0-9B8D-1F47-8ABF-BE3CF9BD2848}" type="datetime1">
               <a:rPr lang="en-US" smtClean="0"/>
-              <a:t>9/2/20</a:t>
+              <a:t>9/7/20</a:t>
             </a:fld>
             <a:endParaRPr lang="en-US" dirty="0"/>
           </a:p>
@@ -12985,10 +13075,10 @@
       </p:sp>
       <p:pic>
         <p:nvPicPr>
-          <p:cNvPr id="4" name="Picture 3">
+          <p:cNvPr id="8" name="Picture 7">
             <a:extLst>
               <a:ext uri="{FF2B5EF4-FFF2-40B4-BE49-F238E27FC236}">
-                <a16:creationId xmlns:a16="http://schemas.microsoft.com/office/drawing/2014/main" id="{ADEDE9B7-B36A-5D4B-AFAE-99204E99DBDB}"/>
+                <a16:creationId xmlns:a16="http://schemas.microsoft.com/office/drawing/2014/main" id="{281DBFB4-1B7E-D145-957A-CFB946839B00}"/>
               </a:ext>
             </a:extLst>
           </p:cNvPr>
@@ -13005,8 +13095,8 @@
         </p:blipFill>
         <p:spPr>
           <a:xfrm rot="5400000">
-            <a:off x="3290229" y="-460664"/>
-            <a:ext cx="5611542" cy="7779327"/>
+            <a:off x="3239135" y="-565937"/>
+            <a:ext cx="5713730" cy="7920990"/>
           </a:xfrm>
           <a:prstGeom prst="rect">
             <a:avLst/>
@@ -13317,7 +13407,7 @@
           <a:p>
             <a:fld id="{3DBB7BD0-9B8D-1F47-8ABF-BE3CF9BD2848}" type="datetime1">
               <a:rPr lang="en-US" smtClean="0"/>
-              <a:t>9/2/20</a:t>
+              <a:t>9/7/20</a:t>
             </a:fld>
             <a:endParaRPr lang="en-US" dirty="0"/>
           </a:p>
@@ -13601,7 +13691,7 @@
           <a:p>
             <a:fld id="{3DBB7BD0-9B8D-1F47-8ABF-BE3CF9BD2848}" type="datetime1">
               <a:rPr lang="en-US" smtClean="0"/>
-              <a:t>9/2/20</a:t>
+              <a:t>9/7/20</a:t>
             </a:fld>
             <a:endParaRPr lang="en-US" dirty="0"/>
           </a:p>
@@ -13885,7 +13975,7 @@
           <a:p>
             <a:fld id="{3DBB7BD0-9B8D-1F47-8ABF-BE3CF9BD2848}" type="datetime1">
               <a:rPr lang="en-US" smtClean="0"/>
-              <a:t>9/2/20</a:t>
+              <a:t>9/7/20</a:t>
             </a:fld>
             <a:endParaRPr lang="en-US" dirty="0"/>
           </a:p>
@@ -14166,7 +14256,7 @@
           <a:p>
             <a:fld id="{3DBB7BD0-9B8D-1F47-8ABF-BE3CF9BD2848}" type="datetime1">
               <a:rPr lang="en-US" smtClean="0"/>
-              <a:t>9/2/20</a:t>
+              <a:t>9/7/20</a:t>
             </a:fld>
             <a:endParaRPr lang="en-US" dirty="0"/>
           </a:p>
@@ -15032,7 +15122,7 @@
           <a:p>
             <a:fld id="{3DBB7BD0-9B8D-1F47-8ABF-BE3CF9BD2848}" type="datetime1">
               <a:rPr lang="en-US" smtClean="0"/>
-              <a:t>9/2/20</a:t>
+              <a:t>9/7/20</a:t>
             </a:fld>
             <a:endParaRPr lang="en-US" dirty="0"/>
           </a:p>
@@ -15438,7 +15528,7 @@
           <a:p>
             <a:fld id="{D52D66B2-0E0A-F441-A1DA-8039F615D612}" type="datetime1">
               <a:rPr lang="en-US" smtClean="0"/>
-              <a:t>9/2/20</a:t>
+              <a:t>9/7/20</a:t>
             </a:fld>
             <a:endParaRPr lang="en-US" dirty="0"/>
           </a:p>
@@ -15922,7 +16012,7 @@
           <a:p>
             <a:fld id="{3DBB7BD0-9B8D-1F47-8ABF-BE3CF9BD2848}" type="datetime1">
               <a:rPr lang="en-US" smtClean="0"/>
-              <a:t>9/2/20</a:t>
+              <a:t>9/7/20</a:t>
             </a:fld>
             <a:endParaRPr lang="en-US" dirty="0"/>
           </a:p>
@@ -16368,7 +16458,7 @@
           <a:p>
             <a:fld id="{F7AFF6A5-F1FB-284A-BF72-2836D5A0B341}" type="datetime1">
               <a:rPr lang="en-US" smtClean="0"/>
-              <a:t>9/2/20</a:t>
+              <a:t>9/7/20</a:t>
             </a:fld>
             <a:endParaRPr lang="en-US" dirty="0"/>
           </a:p>
@@ -17490,7 +17580,7 @@
           <a:p>
             <a:fld id="{D52D66B2-0E0A-F441-A1DA-8039F615D612}" type="datetime1">
               <a:rPr lang="en-US" smtClean="0"/>
-              <a:t>9/2/20</a:t>
+              <a:t>9/7/20</a:t>
             </a:fld>
             <a:endParaRPr lang="en-US" dirty="0"/>
           </a:p>
@@ -17974,7 +18064,7 @@
           <a:p>
             <a:fld id="{3DBB7BD0-9B8D-1F47-8ABF-BE3CF9BD2848}" type="datetime1">
               <a:rPr lang="en-US" smtClean="0"/>
-              <a:t>9/2/20</a:t>
+              <a:t>9/7/20</a:t>
             </a:fld>
             <a:endParaRPr lang="en-US" dirty="0"/>
           </a:p>
@@ -18394,7 +18484,7 @@
           <a:p>
             <a:fld id="{D52D66B2-0E0A-F441-A1DA-8039F615D612}" type="datetime1">
               <a:rPr lang="en-US" smtClean="0"/>
-              <a:t>9/2/20</a:t>
+              <a:t>9/7/20</a:t>
             </a:fld>
             <a:endParaRPr lang="en-US" dirty="0"/>
           </a:p>
@@ -18872,7 +18962,7 @@
           <a:p>
             <a:fld id="{3DBB7BD0-9B8D-1F47-8ABF-BE3CF9BD2848}" type="datetime1">
               <a:rPr lang="en-US" smtClean="0"/>
-              <a:t>9/2/20</a:t>
+              <a:t>9/7/20</a:t>
             </a:fld>
             <a:endParaRPr lang="en-US" dirty="0"/>
           </a:p>
@@ -19253,7 +19343,7 @@
           <a:p>
             <a:fld id="{3DBB7BD0-9B8D-1F47-8ABF-BE3CF9BD2848}" type="datetime1">
               <a:rPr lang="en-US" smtClean="0"/>
-              <a:t>9/2/20</a:t>
+              <a:t>9/7/20</a:t>
             </a:fld>
             <a:endParaRPr lang="en-US" dirty="0"/>
           </a:p>
@@ -19546,7 +19636,7 @@
           <a:p>
             <a:fld id="{3DBB7BD0-9B8D-1F47-8ABF-BE3CF9BD2848}" type="datetime1">
               <a:rPr lang="en-US" smtClean="0"/>
-              <a:t>9/2/20</a:t>
+              <a:t>9/7/20</a:t>
             </a:fld>
             <a:endParaRPr lang="en-US" dirty="0"/>
           </a:p>
@@ -19822,7 +19912,7 @@
           <a:p>
             <a:fld id="{3DBB7BD0-9B8D-1F47-8ABF-BE3CF9BD2848}" type="datetime1">
               <a:rPr lang="en-US" smtClean="0"/>
-              <a:t>9/2/20</a:t>
+              <a:t>9/7/20</a:t>
             </a:fld>
             <a:endParaRPr lang="en-US" dirty="0"/>
           </a:p>
@@ -19976,7 +20066,7 @@
           <a:p>
             <a:fld id="{01554C39-4607-164F-AA23-65A72270ACF7}" type="datetime1">
               <a:rPr lang="en-US" smtClean="0"/>
-              <a:t>9/2/20</a:t>
+              <a:t>9/7/20</a:t>
             </a:fld>
             <a:endParaRPr lang="en-US" dirty="0"/>
           </a:p>
@@ -20260,7 +20350,7 @@
           <a:p>
             <a:fld id="{01554C39-4607-164F-AA23-65A72270ACF7}" type="datetime1">
               <a:rPr lang="en-US" smtClean="0"/>
-              <a:t>9/2/20</a:t>
+              <a:t>9/7/20</a:t>
             </a:fld>
             <a:endParaRPr lang="en-US" dirty="0"/>
           </a:p>
@@ -20544,7 +20634,7 @@
           <a:p>
             <a:fld id="{01554C39-4607-164F-AA23-65A72270ACF7}" type="datetime1">
               <a:rPr lang="en-US" smtClean="0"/>
-              <a:t>9/2/20</a:t>
+              <a:t>9/7/20</a:t>
             </a:fld>
             <a:endParaRPr lang="en-US" dirty="0"/>
           </a:p>
@@ -20824,7 +20914,7 @@
           <a:p>
             <a:fld id="{01554C39-4607-164F-AA23-65A72270ACF7}" type="datetime1">
               <a:rPr lang="en-US" smtClean="0"/>
-              <a:t>9/2/20</a:t>
+              <a:t>9/7/20</a:t>
             </a:fld>
             <a:endParaRPr lang="en-US" dirty="0"/>
           </a:p>
@@ -21065,7 +21155,7 @@
           <a:p>
             <a:fld id="{01554C39-4607-164F-AA23-65A72270ACF7}" type="datetime1">
               <a:rPr lang="en-US" smtClean="0"/>
-              <a:t>9/2/20</a:t>
+              <a:t>9/7/20</a:t>
             </a:fld>
             <a:endParaRPr lang="en-US" dirty="0"/>
           </a:p>
@@ -21346,7 +21436,7 @@
           <a:p>
             <a:fld id="{01554C39-4607-164F-AA23-65A72270ACF7}" type="datetime1">
               <a:rPr lang="en-US" smtClean="0"/>
-              <a:t>9/2/20</a:t>
+              <a:t>9/7/20</a:t>
             </a:fld>
             <a:endParaRPr lang="en-US" dirty="0"/>
           </a:p>
@@ -21627,7 +21717,7 @@
           <a:p>
             <a:fld id="{01554C39-4607-164F-AA23-65A72270ACF7}" type="datetime1">
               <a:rPr lang="en-US" smtClean="0"/>
-              <a:t>9/2/20</a:t>
+              <a:t>9/7/20</a:t>
             </a:fld>
             <a:endParaRPr lang="en-US" dirty="0"/>
           </a:p>
@@ -21908,7 +21998,7 @@
           <a:p>
             <a:fld id="{01554C39-4607-164F-AA23-65A72270ACF7}" type="datetime1">
               <a:rPr lang="en-US" smtClean="0"/>
-              <a:t>9/2/20</a:t>
+              <a:t>9/7/20</a:t>
             </a:fld>
             <a:endParaRPr lang="en-US" dirty="0"/>
           </a:p>
@@ -22192,7 +22282,7 @@
           <a:p>
             <a:fld id="{01554C39-4607-164F-AA23-65A72270ACF7}" type="datetime1">
               <a:rPr lang="en-US" smtClean="0"/>
-              <a:t>9/2/20</a:t>
+              <a:t>9/7/20</a:t>
             </a:fld>
             <a:endParaRPr lang="en-US" dirty="0"/>
           </a:p>

</xml_diff>